<commit_message>
Updates for CNUG event
</commit_message>
<xml_diff>
--- a/T-SQL Code analysis.pptx
+++ b/T-SQL Code analysis.pptx
@@ -6,18 +6,20 @@
   </p:sldMasterIdLst>
   <p:sldIdLst>
     <p:sldId id="260" r:id="rId2"/>
-    <p:sldId id="261" r:id="rId3"/>
-    <p:sldId id="264" r:id="rId4"/>
-    <p:sldId id="258" r:id="rId5"/>
-    <p:sldId id="265" r:id="rId6"/>
-    <p:sldId id="257" r:id="rId7"/>
-    <p:sldId id="266" r:id="rId8"/>
-    <p:sldId id="256" r:id="rId9"/>
-    <p:sldId id="267" r:id="rId10"/>
-    <p:sldId id="263" r:id="rId11"/>
-    <p:sldId id="280" r:id="rId12"/>
-    <p:sldId id="275" r:id="rId13"/>
-    <p:sldId id="279" r:id="rId14"/>
+    <p:sldId id="282" r:id="rId3"/>
+    <p:sldId id="281" r:id="rId4"/>
+    <p:sldId id="263" r:id="rId5"/>
+    <p:sldId id="280" r:id="rId6"/>
+    <p:sldId id="264" r:id="rId7"/>
+    <p:sldId id="257" r:id="rId8"/>
+    <p:sldId id="284" r:id="rId9"/>
+    <p:sldId id="283" r:id="rId10"/>
+    <p:sldId id="279" r:id="rId11"/>
+    <p:sldId id="266" r:id="rId12"/>
+    <p:sldId id="256" r:id="rId13"/>
+    <p:sldId id="258" r:id="rId14"/>
+    <p:sldId id="267" r:id="rId15"/>
+    <p:sldId id="275" r:id="rId16"/>
   </p:sldIdLst>
   <p:sldSz cx="12192000" cy="6858000"/>
   <p:notesSz cx="6858000" cy="9144000"/>
@@ -3207,6 +3209,17 @@
             <a:rPr lang="da-DK" dirty="0" err="1"/>
             <a:t>Build</a:t>
           </a:r>
+          <a:r>
+            <a:rPr lang="da-DK" dirty="0"/>
+            <a:t> &amp; </a:t>
+          </a:r>
+          <a:br>
+            <a:rPr lang="da-DK" dirty="0"/>
+          </a:br>
+          <a:r>
+            <a:rPr lang="da-DK" dirty="0" err="1"/>
+            <a:t>Analyze</a:t>
+          </a:r>
           <a:endParaRPr lang="da-DK" dirty="0"/>
         </a:p>
       </dgm:t>
@@ -3539,6 +3552,17 @@
           <a:r>
             <a:rPr lang="da-DK" dirty="0" err="1"/>
             <a:t>Build</a:t>
+          </a:r>
+          <a:r>
+            <a:rPr lang="da-DK" dirty="0"/>
+            <a:t> &amp;</a:t>
+          </a:r>
+          <a:br>
+            <a:rPr lang="da-DK" dirty="0"/>
+          </a:br>
+          <a:r>
+            <a:rPr lang="da-DK" dirty="0" err="1"/>
+            <a:t>Analyze</a:t>
           </a:r>
           <a:endParaRPr lang="da-DK" dirty="0"/>
         </a:p>
@@ -4547,6 +4571,17 @@
             <a:rPr lang="da-DK" sz="1800" kern="1200" dirty="0" err="1"/>
             <a:t>Build</a:t>
           </a:r>
+          <a:r>
+            <a:rPr lang="da-DK" sz="1800" kern="1200" dirty="0"/>
+            <a:t> &amp; </a:t>
+          </a:r>
+          <a:br>
+            <a:rPr lang="da-DK" sz="1800" kern="1200" dirty="0"/>
+          </a:br>
+          <a:r>
+            <a:rPr lang="da-DK" sz="1800" kern="1200" dirty="0" err="1"/>
+            <a:t>Analyze</a:t>
+          </a:r>
           <a:endParaRPr lang="da-DK" sz="1800" kern="1200" dirty="0"/>
         </a:p>
       </dsp:txBody>
@@ -5254,6 +5289,17 @@
           <a:r>
             <a:rPr lang="da-DK" sz="1800" kern="1200" dirty="0" err="1"/>
             <a:t>Build</a:t>
+          </a:r>
+          <a:r>
+            <a:rPr lang="da-DK" sz="1800" kern="1200" dirty="0"/>
+            <a:t> &amp;</a:t>
+          </a:r>
+          <a:br>
+            <a:rPr lang="da-DK" sz="1800" kern="1200" dirty="0"/>
+          </a:br>
+          <a:r>
+            <a:rPr lang="da-DK" sz="1800" kern="1200" dirty="0" err="1"/>
+            <a:t>Analyze</a:t>
           </a:r>
           <a:endParaRPr lang="da-DK" sz="1800" kern="1200" dirty="0"/>
         </a:p>
@@ -9968,7 +10014,7 @@
           <a:p>
             <a:fld id="{100FD589-5CEC-4C5D-B34D-E6C06527026F}" type="datetimeFigureOut">
               <a:rPr lang="da-DK" smtClean="0"/>
-              <a:t>11-12-2024</a:t>
+              <a:t>25-01-2025</a:t>
             </a:fld>
             <a:endParaRPr lang="da-DK"/>
           </a:p>
@@ -10168,7 +10214,7 @@
           <a:p>
             <a:fld id="{100FD589-5CEC-4C5D-B34D-E6C06527026F}" type="datetimeFigureOut">
               <a:rPr lang="da-DK" smtClean="0"/>
-              <a:t>11-12-2024</a:t>
+              <a:t>25-01-2025</a:t>
             </a:fld>
             <a:endParaRPr lang="da-DK"/>
           </a:p>
@@ -10378,7 +10424,7 @@
           <a:p>
             <a:fld id="{100FD589-5CEC-4C5D-B34D-E6C06527026F}" type="datetimeFigureOut">
               <a:rPr lang="da-DK" smtClean="0"/>
-              <a:t>11-12-2024</a:t>
+              <a:t>25-01-2025</a:t>
             </a:fld>
             <a:endParaRPr lang="da-DK"/>
           </a:p>
@@ -10578,7 +10624,7 @@
           <a:p>
             <a:fld id="{100FD589-5CEC-4C5D-B34D-E6C06527026F}" type="datetimeFigureOut">
               <a:rPr lang="da-DK" smtClean="0"/>
-              <a:t>11-12-2024</a:t>
+              <a:t>25-01-2025</a:t>
             </a:fld>
             <a:endParaRPr lang="da-DK"/>
           </a:p>
@@ -10854,7 +10900,7 @@
           <a:p>
             <a:fld id="{100FD589-5CEC-4C5D-B34D-E6C06527026F}" type="datetimeFigureOut">
               <a:rPr lang="da-DK" smtClean="0"/>
-              <a:t>11-12-2024</a:t>
+              <a:t>25-01-2025</a:t>
             </a:fld>
             <a:endParaRPr lang="da-DK"/>
           </a:p>
@@ -11122,7 +11168,7 @@
           <a:p>
             <a:fld id="{100FD589-5CEC-4C5D-B34D-E6C06527026F}" type="datetimeFigureOut">
               <a:rPr lang="da-DK" smtClean="0"/>
-              <a:t>11-12-2024</a:t>
+              <a:t>25-01-2025</a:t>
             </a:fld>
             <a:endParaRPr lang="da-DK"/>
           </a:p>
@@ -11537,7 +11583,7 @@
           <a:p>
             <a:fld id="{100FD589-5CEC-4C5D-B34D-E6C06527026F}" type="datetimeFigureOut">
               <a:rPr lang="da-DK" smtClean="0"/>
-              <a:t>11-12-2024</a:t>
+              <a:t>25-01-2025</a:t>
             </a:fld>
             <a:endParaRPr lang="da-DK"/>
           </a:p>
@@ -11679,7 +11725,7 @@
           <a:p>
             <a:fld id="{100FD589-5CEC-4C5D-B34D-E6C06527026F}" type="datetimeFigureOut">
               <a:rPr lang="da-DK" smtClean="0"/>
-              <a:t>11-12-2024</a:t>
+              <a:t>25-01-2025</a:t>
             </a:fld>
             <a:endParaRPr lang="da-DK"/>
           </a:p>
@@ -11792,7 +11838,7 @@
           <a:p>
             <a:fld id="{100FD589-5CEC-4C5D-B34D-E6C06527026F}" type="datetimeFigureOut">
               <a:rPr lang="da-DK" smtClean="0"/>
-              <a:t>11-12-2024</a:t>
+              <a:t>25-01-2025</a:t>
             </a:fld>
             <a:endParaRPr lang="da-DK"/>
           </a:p>
@@ -12105,7 +12151,7 @@
           <a:p>
             <a:fld id="{100FD589-5CEC-4C5D-B34D-E6C06527026F}" type="datetimeFigureOut">
               <a:rPr lang="da-DK" smtClean="0"/>
-              <a:t>11-12-2024</a:t>
+              <a:t>25-01-2025</a:t>
             </a:fld>
             <a:endParaRPr lang="da-DK"/>
           </a:p>
@@ -12394,7 +12440,7 @@
           <a:p>
             <a:fld id="{100FD589-5CEC-4C5D-B34D-E6C06527026F}" type="datetimeFigureOut">
               <a:rPr lang="da-DK" smtClean="0"/>
-              <a:t>11-12-2024</a:t>
+              <a:t>25-01-2025</a:t>
             </a:fld>
             <a:endParaRPr lang="da-DK"/>
           </a:p>
@@ -12637,7 +12683,7 @@
           <a:p>
             <a:fld id="{100FD589-5CEC-4C5D-B34D-E6C06527026F}" type="datetimeFigureOut">
               <a:rPr lang="da-DK" smtClean="0"/>
-              <a:t>11-12-2024</a:t>
+              <a:t>25-01-2025</a:t>
             </a:fld>
             <a:endParaRPr lang="da-DK"/>
           </a:p>
@@ -13078,40 +13124,20 @@
           <a:lstStyle/>
           <a:p>
             <a:r>
+              <a:rPr lang="da-DK" dirty="0" err="1"/>
+              <a:t>Modern</a:t>
+            </a:r>
+            <a:r>
               <a:rPr lang="da-DK" dirty="0"/>
-              <a:t>Code </a:t>
+              <a:t> .NET </a:t>
             </a:r>
             <a:r>
               <a:rPr lang="da-DK" dirty="0" err="1"/>
-              <a:t>analyze</a:t>
+              <a:t>development</a:t>
             </a:r>
             <a:r>
               <a:rPr lang="da-DK" dirty="0"/>
-              <a:t> </a:t>
-            </a:r>
-            <a:r>
-              <a:rPr lang="da-DK" dirty="0" err="1"/>
-              <a:t>my</a:t>
-            </a:r>
-            <a:r>
-              <a:rPr lang="da-DK" dirty="0"/>
-              <a:t> SQL </a:t>
-            </a:r>
-            <a:r>
-              <a:rPr lang="da-DK" dirty="0" err="1"/>
-              <a:t>code</a:t>
-            </a:r>
-            <a:r>
-              <a:rPr lang="da-DK" dirty="0"/>
-              <a:t> and </a:t>
-            </a:r>
-            <a:r>
-              <a:rPr lang="da-DK" dirty="0" err="1"/>
-              <a:t>schema</a:t>
-            </a:r>
-            <a:r>
-              <a:rPr lang="da-DK" dirty="0"/>
-              <a:t> with .NET</a:t>
+              <a:t> with SQL Server</a:t>
             </a:r>
           </a:p>
         </p:txBody>
@@ -13158,564 +13184,6 @@
 </file>
 
 <file path=ppt/slides/slide10.xml><?xml version="1.0" encoding="utf-8"?>
-<p:sld xmlns:a="http://schemas.openxmlformats.org/drawingml/2006/main" xmlns:r="http://schemas.openxmlformats.org/officeDocument/2006/relationships" xmlns:p="http://schemas.openxmlformats.org/presentationml/2006/main">
-  <p:cSld>
-    <p:spTree>
-      <p:nvGrpSpPr>
-        <p:cNvPr id="1" name=""/>
-        <p:cNvGrpSpPr/>
-        <p:nvPr/>
-      </p:nvGrpSpPr>
-      <p:grpSpPr>
-        <a:xfrm>
-          <a:off x="0" y="0"/>
-          <a:ext cx="0" cy="0"/>
-          <a:chOff x="0" y="0"/>
-          <a:chExt cx="0" cy="0"/>
-        </a:xfrm>
-      </p:grpSpPr>
-      <p:sp>
-        <p:nvSpPr>
-          <p:cNvPr id="2" name="Title 1">
-            <a:extLst>
-              <a:ext uri="{FF2B5EF4-FFF2-40B4-BE49-F238E27FC236}">
-                <a16:creationId xmlns:a16="http://schemas.microsoft.com/office/drawing/2014/main" id="{B0D5BB5B-7FFA-DB8B-F802-03B5D520D180}"/>
-              </a:ext>
-            </a:extLst>
-          </p:cNvPr>
-          <p:cNvSpPr>
-            <a:spLocks noGrp="1"/>
-          </p:cNvSpPr>
-          <p:nvPr>
-            <p:ph type="title"/>
-          </p:nvPr>
-        </p:nvSpPr>
-        <p:spPr/>
-        <p:txBody>
-          <a:bodyPr/>
-          <a:lstStyle/>
-          <a:p>
-            <a:r>
-              <a:rPr lang="da-DK" dirty="0" err="1"/>
-              <a:t>Process</a:t>
-            </a:r>
-            <a:endParaRPr lang="da-DK" dirty="0"/>
-          </a:p>
-        </p:txBody>
-      </p:sp>
-      <p:graphicFrame>
-        <p:nvGraphicFramePr>
-          <p:cNvPr id="4" name="Content Placeholder 3">
-            <a:extLst>
-              <a:ext uri="{FF2B5EF4-FFF2-40B4-BE49-F238E27FC236}">
-                <a16:creationId xmlns:a16="http://schemas.microsoft.com/office/drawing/2014/main" id="{14C458CB-FE86-0722-5465-2135D8B24067}"/>
-              </a:ext>
-            </a:extLst>
-          </p:cNvPr>
-          <p:cNvGraphicFramePr>
-            <a:graphicFrameLocks noGrp="1"/>
-          </p:cNvGraphicFramePr>
-          <p:nvPr>
-            <p:ph idx="1"/>
-            <p:extLst>
-              <p:ext uri="{D42A27DB-BD31-4B8C-83A1-F6EECF244321}">
-                <p14:modId xmlns:p14="http://schemas.microsoft.com/office/powerpoint/2010/main" val="2248799468"/>
-              </p:ext>
-            </p:extLst>
-          </p:nvPr>
-        </p:nvGraphicFramePr>
-        <p:xfrm>
-          <a:off x="838200" y="1825625"/>
-          <a:ext cx="10515600" cy="4351338"/>
-        </p:xfrm>
-        <a:graphic>
-          <a:graphicData uri="http://schemas.openxmlformats.org/drawingml/2006/diagram">
-            <dgm:relIds xmlns:dgm="http://schemas.openxmlformats.org/drawingml/2006/diagram" xmlns:r="http://schemas.openxmlformats.org/officeDocument/2006/relationships" r:dm="rId2" r:lo="rId3" r:qs="rId4" r:cs="rId5"/>
-          </a:graphicData>
-        </a:graphic>
-      </p:graphicFrame>
-    </p:spTree>
-    <p:extLst>
-      <p:ext uri="{BB962C8B-B14F-4D97-AF65-F5344CB8AC3E}">
-        <p14:creationId xmlns:p14="http://schemas.microsoft.com/office/powerpoint/2010/main" val="4018992247"/>
-      </p:ext>
-    </p:extLst>
-  </p:cSld>
-  <p:clrMapOvr>
-    <a:masterClrMapping/>
-  </p:clrMapOvr>
-</p:sld>
-</file>
-
-<file path=ppt/slides/slide11.xml><?xml version="1.0" encoding="utf-8"?>
-<p:sld xmlns:a="http://schemas.openxmlformats.org/drawingml/2006/main" xmlns:r="http://schemas.openxmlformats.org/officeDocument/2006/relationships" xmlns:p="http://schemas.openxmlformats.org/presentationml/2006/main">
-  <p:cSld>
-    <p:spTree>
-      <p:nvGrpSpPr>
-        <p:cNvPr id="1" name=""/>
-        <p:cNvGrpSpPr/>
-        <p:nvPr/>
-      </p:nvGrpSpPr>
-      <p:grpSpPr>
-        <a:xfrm>
-          <a:off x="0" y="0"/>
-          <a:ext cx="0" cy="0"/>
-          <a:chOff x="0" y="0"/>
-          <a:chExt cx="0" cy="0"/>
-        </a:xfrm>
-      </p:grpSpPr>
-      <p:sp>
-        <p:nvSpPr>
-          <p:cNvPr id="2" name="Title 1">
-            <a:extLst>
-              <a:ext uri="{FF2B5EF4-FFF2-40B4-BE49-F238E27FC236}">
-                <a16:creationId xmlns:a16="http://schemas.microsoft.com/office/drawing/2014/main" id="{B0D5BB5B-7FFA-DB8B-F802-03B5D520D180}"/>
-              </a:ext>
-            </a:extLst>
-          </p:cNvPr>
-          <p:cNvSpPr>
-            <a:spLocks noGrp="1"/>
-          </p:cNvSpPr>
-          <p:nvPr>
-            <p:ph type="title"/>
-          </p:nvPr>
-        </p:nvSpPr>
-        <p:spPr/>
-        <p:txBody>
-          <a:bodyPr/>
-          <a:lstStyle/>
-          <a:p>
-            <a:r>
-              <a:rPr lang="da-DK" dirty="0" err="1"/>
-              <a:t>Tooling</a:t>
-            </a:r>
-            <a:endParaRPr lang="da-DK" dirty="0"/>
-          </a:p>
-        </p:txBody>
-      </p:sp>
-      <p:graphicFrame>
-        <p:nvGraphicFramePr>
-          <p:cNvPr id="4" name="Content Placeholder 3">
-            <a:extLst>
-              <a:ext uri="{FF2B5EF4-FFF2-40B4-BE49-F238E27FC236}">
-                <a16:creationId xmlns:a16="http://schemas.microsoft.com/office/drawing/2014/main" id="{14C458CB-FE86-0722-5465-2135D8B24067}"/>
-              </a:ext>
-            </a:extLst>
-          </p:cNvPr>
-          <p:cNvGraphicFramePr>
-            <a:graphicFrameLocks noGrp="1"/>
-          </p:cNvGraphicFramePr>
-          <p:nvPr>
-            <p:ph idx="1"/>
-            <p:extLst>
-              <p:ext uri="{D42A27DB-BD31-4B8C-83A1-F6EECF244321}">
-                <p14:modId xmlns:p14="http://schemas.microsoft.com/office/powerpoint/2010/main" val="457926106"/>
-              </p:ext>
-            </p:extLst>
-          </p:nvPr>
-        </p:nvGraphicFramePr>
-        <p:xfrm>
-          <a:off x="838200" y="1825625"/>
-          <a:ext cx="10515600" cy="4351338"/>
-        </p:xfrm>
-        <a:graphic>
-          <a:graphicData uri="http://schemas.openxmlformats.org/drawingml/2006/diagram">
-            <dgm:relIds xmlns:dgm="http://schemas.openxmlformats.org/drawingml/2006/diagram" xmlns:r="http://schemas.openxmlformats.org/officeDocument/2006/relationships" r:dm="rId2" r:lo="rId3" r:qs="rId4" r:cs="rId5"/>
-          </a:graphicData>
-        </a:graphic>
-      </p:graphicFrame>
-      <p:sp>
-        <p:nvSpPr>
-          <p:cNvPr id="3" name="TextBox 2">
-            <a:extLst>
-              <a:ext uri="{FF2B5EF4-FFF2-40B4-BE49-F238E27FC236}">
-                <a16:creationId xmlns:a16="http://schemas.microsoft.com/office/drawing/2014/main" id="{D0002042-9439-C760-352C-9B1314C5F520}"/>
-              </a:ext>
-            </a:extLst>
-          </p:cNvPr>
-          <p:cNvSpPr txBox="1"/>
-          <p:nvPr/>
-        </p:nvSpPr>
-        <p:spPr>
-          <a:xfrm>
-            <a:off x="1297858" y="4739147"/>
-            <a:ext cx="2438400" cy="1200329"/>
-          </a:xfrm>
-          <a:prstGeom prst="rect">
-            <a:avLst/>
-          </a:prstGeom>
-          <a:noFill/>
-        </p:spPr>
-        <p:txBody>
-          <a:bodyPr wrap="square" rtlCol="0">
-            <a:spAutoFit/>
-          </a:bodyPr>
-          <a:lstStyle/>
-          <a:p>
-            <a:r>
-              <a:rPr lang="da-DK" dirty="0"/>
-              <a:t>Visual Studio</a:t>
-            </a:r>
-          </a:p>
-          <a:p>
-            <a:r>
-              <a:rPr lang="da-DK" dirty="0"/>
-              <a:t>VS Code</a:t>
-            </a:r>
-          </a:p>
-          <a:p>
-            <a:r>
-              <a:rPr lang="da-DK" dirty="0" err="1"/>
-              <a:t>sqlpackage</a:t>
-            </a:r>
-            <a:r>
-              <a:rPr lang="da-DK" dirty="0"/>
-              <a:t> </a:t>
-            </a:r>
-            <a:r>
-              <a:rPr lang="da-DK" dirty="0" err="1"/>
-              <a:t>extract</a:t>
-            </a:r>
-            <a:endParaRPr lang="da-DK" dirty="0"/>
-          </a:p>
-          <a:p>
-            <a:r>
-              <a:rPr lang="da-DK" dirty="0" err="1"/>
-              <a:t>dotnet</a:t>
-            </a:r>
-            <a:r>
-              <a:rPr lang="da-DK" dirty="0"/>
-              <a:t> new</a:t>
-            </a:r>
-          </a:p>
-        </p:txBody>
-      </p:sp>
-      <p:sp>
-        <p:nvSpPr>
-          <p:cNvPr id="5" name="TextBox 4">
-            <a:extLst>
-              <a:ext uri="{FF2B5EF4-FFF2-40B4-BE49-F238E27FC236}">
-                <a16:creationId xmlns:a16="http://schemas.microsoft.com/office/drawing/2014/main" id="{F736263C-7EC6-28BD-BD25-C6CFCC5126F2}"/>
-              </a:ext>
-            </a:extLst>
-          </p:cNvPr>
-          <p:cNvSpPr txBox="1"/>
-          <p:nvPr/>
-        </p:nvSpPr>
-        <p:spPr>
-          <a:xfrm>
-            <a:off x="5287302" y="4891547"/>
-            <a:ext cx="1600200" cy="923330"/>
-          </a:xfrm>
-          <a:prstGeom prst="rect">
-            <a:avLst/>
-          </a:prstGeom>
-          <a:noFill/>
-        </p:spPr>
-        <p:txBody>
-          <a:bodyPr wrap="square" rtlCol="0">
-            <a:spAutoFit/>
-          </a:bodyPr>
-          <a:lstStyle/>
-          <a:p>
-            <a:r>
-              <a:rPr lang="da-DK" dirty="0" err="1"/>
-              <a:t>MSBuild</a:t>
-            </a:r>
-            <a:endParaRPr lang="da-DK" dirty="0"/>
-          </a:p>
-          <a:p>
-            <a:r>
-              <a:rPr lang="da-DK" dirty="0" err="1"/>
-              <a:t>dotnet</a:t>
-            </a:r>
-            <a:r>
-              <a:rPr lang="da-DK" dirty="0"/>
-              <a:t> </a:t>
-            </a:r>
-            <a:r>
-              <a:rPr lang="da-DK" dirty="0" err="1"/>
-              <a:t>build</a:t>
-            </a:r>
-            <a:endParaRPr lang="da-DK" dirty="0"/>
-          </a:p>
-          <a:p>
-            <a:r>
-              <a:rPr lang="da-DK" dirty="0" err="1"/>
-              <a:t>dotnet</a:t>
-            </a:r>
-            <a:r>
-              <a:rPr lang="da-DK" dirty="0"/>
-              <a:t> </a:t>
-            </a:r>
-            <a:r>
-              <a:rPr lang="da-DK" dirty="0" err="1"/>
-              <a:t>pack</a:t>
-            </a:r>
-            <a:endParaRPr lang="da-DK" dirty="0"/>
-          </a:p>
-        </p:txBody>
-      </p:sp>
-      <p:sp>
-        <p:nvSpPr>
-          <p:cNvPr id="6" name="TextBox 5">
-            <a:extLst>
-              <a:ext uri="{FF2B5EF4-FFF2-40B4-BE49-F238E27FC236}">
-                <a16:creationId xmlns:a16="http://schemas.microsoft.com/office/drawing/2014/main" id="{58694100-CEF9-DF56-F98E-6A48126062C4}"/>
-              </a:ext>
-            </a:extLst>
-          </p:cNvPr>
-          <p:cNvSpPr txBox="1"/>
-          <p:nvPr/>
-        </p:nvSpPr>
-        <p:spPr>
-          <a:xfrm>
-            <a:off x="8681885" y="4798139"/>
-            <a:ext cx="2723556" cy="923330"/>
-          </a:xfrm>
-          <a:prstGeom prst="rect">
-            <a:avLst/>
-          </a:prstGeom>
-          <a:noFill/>
-        </p:spPr>
-        <p:txBody>
-          <a:bodyPr wrap="square" rtlCol="0">
-            <a:spAutoFit/>
-          </a:bodyPr>
-          <a:lstStyle/>
-          <a:p>
-            <a:r>
-              <a:rPr lang="da-DK" dirty="0" err="1"/>
-              <a:t>Azure</a:t>
-            </a:r>
-            <a:r>
-              <a:rPr lang="da-DK" dirty="0"/>
-              <a:t> </a:t>
-            </a:r>
-            <a:r>
-              <a:rPr lang="da-DK" dirty="0" err="1"/>
-              <a:t>DevOps</a:t>
-            </a:r>
-            <a:r>
-              <a:rPr lang="da-DK" dirty="0"/>
-              <a:t> pipelines</a:t>
-            </a:r>
-          </a:p>
-          <a:p>
-            <a:r>
-              <a:rPr lang="da-DK" dirty="0"/>
-              <a:t>GitHub actions</a:t>
-            </a:r>
-          </a:p>
-          <a:p>
-            <a:r>
-              <a:rPr lang="da-DK" dirty="0" err="1"/>
-              <a:t>sqlpackage</a:t>
-            </a:r>
-            <a:r>
-              <a:rPr lang="da-DK" dirty="0"/>
-              <a:t> </a:t>
-            </a:r>
-            <a:r>
-              <a:rPr lang="da-DK" dirty="0" err="1"/>
-              <a:t>publish</a:t>
-            </a:r>
-            <a:endParaRPr lang="da-DK" dirty="0"/>
-          </a:p>
-        </p:txBody>
-      </p:sp>
-    </p:spTree>
-    <p:extLst>
-      <p:ext uri="{BB962C8B-B14F-4D97-AF65-F5344CB8AC3E}">
-        <p14:creationId xmlns:p14="http://schemas.microsoft.com/office/powerpoint/2010/main" val="1421945649"/>
-      </p:ext>
-    </p:extLst>
-  </p:cSld>
-  <p:clrMapOvr>
-    <a:masterClrMapping/>
-  </p:clrMapOvr>
-</p:sld>
-</file>
-
-<file path=ppt/slides/slide12.xml><?xml version="1.0" encoding="utf-8"?>
-<p:sld xmlns:a="http://schemas.openxmlformats.org/drawingml/2006/main" xmlns:r="http://schemas.openxmlformats.org/officeDocument/2006/relationships" xmlns:p="http://schemas.openxmlformats.org/presentationml/2006/main">
-  <p:cSld>
-    <p:spTree>
-      <p:nvGrpSpPr>
-        <p:cNvPr id="1" name=""/>
-        <p:cNvGrpSpPr/>
-        <p:nvPr/>
-      </p:nvGrpSpPr>
-      <p:grpSpPr>
-        <a:xfrm>
-          <a:off x="0" y="0"/>
-          <a:ext cx="0" cy="0"/>
-          <a:chOff x="0" y="0"/>
-          <a:chExt cx="0" cy="0"/>
-        </a:xfrm>
-      </p:grpSpPr>
-      <p:sp>
-        <p:nvSpPr>
-          <p:cNvPr id="2" name="Title 1">
-            <a:extLst>
-              <a:ext uri="{FF2B5EF4-FFF2-40B4-BE49-F238E27FC236}">
-                <a16:creationId xmlns:a16="http://schemas.microsoft.com/office/drawing/2014/main" id="{B0D5BB5B-7FFA-DB8B-F802-03B5D520D180}"/>
-              </a:ext>
-            </a:extLst>
-          </p:cNvPr>
-          <p:cNvSpPr>
-            <a:spLocks noGrp="1"/>
-          </p:cNvSpPr>
-          <p:nvPr>
-            <p:ph type="title"/>
-          </p:nvPr>
-        </p:nvSpPr>
-        <p:spPr/>
-        <p:txBody>
-          <a:bodyPr/>
-          <a:lstStyle/>
-          <a:p>
-            <a:r>
-              <a:rPr lang="da-DK" dirty="0" err="1"/>
-              <a:t>Process</a:t>
-            </a:r>
-            <a:endParaRPr lang="da-DK" dirty="0"/>
-          </a:p>
-        </p:txBody>
-      </p:sp>
-      <p:graphicFrame>
-        <p:nvGraphicFramePr>
-          <p:cNvPr id="4" name="Content Placeholder 3">
-            <a:extLst>
-              <a:ext uri="{FF2B5EF4-FFF2-40B4-BE49-F238E27FC236}">
-                <a16:creationId xmlns:a16="http://schemas.microsoft.com/office/drawing/2014/main" id="{14C458CB-FE86-0722-5465-2135D8B24067}"/>
-              </a:ext>
-            </a:extLst>
-          </p:cNvPr>
-          <p:cNvGraphicFramePr>
-            <a:graphicFrameLocks noGrp="1"/>
-          </p:cNvGraphicFramePr>
-          <p:nvPr>
-            <p:ph idx="1"/>
-          </p:nvPr>
-        </p:nvGraphicFramePr>
-        <p:xfrm>
-          <a:off x="838200" y="1825625"/>
-          <a:ext cx="10515600" cy="4351338"/>
-        </p:xfrm>
-        <a:graphic>
-          <a:graphicData uri="http://schemas.openxmlformats.org/drawingml/2006/diagram">
-            <dgm:relIds xmlns:dgm="http://schemas.openxmlformats.org/drawingml/2006/diagram" xmlns:r="http://schemas.openxmlformats.org/officeDocument/2006/relationships" r:dm="rId2" r:lo="rId3" r:qs="rId4" r:cs="rId5"/>
-          </a:graphicData>
-        </a:graphic>
-      </p:graphicFrame>
-      <p:sp>
-        <p:nvSpPr>
-          <p:cNvPr id="3" name="Arrow: Down 2">
-            <a:extLst>
-              <a:ext uri="{FF2B5EF4-FFF2-40B4-BE49-F238E27FC236}">
-                <a16:creationId xmlns:a16="http://schemas.microsoft.com/office/drawing/2014/main" id="{41A997FB-CF39-A7D3-CBE9-49B7A0E95D4B}"/>
-              </a:ext>
-            </a:extLst>
-          </p:cNvPr>
-          <p:cNvSpPr/>
-          <p:nvPr/>
-        </p:nvSpPr>
-        <p:spPr>
-          <a:xfrm>
-            <a:off x="8072581" y="2161309"/>
-            <a:ext cx="484632" cy="978408"/>
-          </a:xfrm>
-          <a:prstGeom prst="downArrow">
-            <a:avLst/>
-          </a:prstGeom>
-        </p:spPr>
-        <p:style>
-          <a:lnRef idx="2">
-            <a:schemeClr val="accent1">
-              <a:shade val="50000"/>
-            </a:schemeClr>
-          </a:lnRef>
-          <a:fillRef idx="1">
-            <a:schemeClr val="accent1"/>
-          </a:fillRef>
-          <a:effectRef idx="0">
-            <a:schemeClr val="accent1"/>
-          </a:effectRef>
-          <a:fontRef idx="minor">
-            <a:schemeClr val="lt1"/>
-          </a:fontRef>
-        </p:style>
-        <p:txBody>
-          <a:bodyPr rtlCol="0" anchor="ctr"/>
-          <a:lstStyle/>
-          <a:p>
-            <a:pPr algn="ctr"/>
-            <a:endParaRPr lang="da-DK"/>
-          </a:p>
-        </p:txBody>
-      </p:sp>
-      <p:pic>
-        <p:nvPicPr>
-          <p:cNvPr id="1026" name="Picture 2" descr="Microscope Cartoon Vector Icon Illustration - Microscope - Sticker |  TeePublic">
-            <a:extLst>
-              <a:ext uri="{FF2B5EF4-FFF2-40B4-BE49-F238E27FC236}">
-                <a16:creationId xmlns:a16="http://schemas.microsoft.com/office/drawing/2014/main" id="{0C12428C-43EA-42B3-B5FD-98F46FCED002}"/>
-              </a:ext>
-            </a:extLst>
-          </p:cNvPr>
-          <p:cNvPicPr>
-            <a:picLocks noChangeAspect="1" noChangeArrowheads="1"/>
-          </p:cNvPicPr>
-          <p:nvPr/>
-        </p:nvPicPr>
-        <p:blipFill>
-          <a:blip r:embed="rId7">
-            <a:extLst>
-              <a:ext uri="{28A0092B-C50C-407E-A947-70E740481C1C}">
-                <a14:useLocalDpi xmlns:a14="http://schemas.microsoft.com/office/drawing/2010/main" val="0"/>
-              </a:ext>
-            </a:extLst>
-          </a:blip>
-          <a:srcRect/>
-          <a:stretch>
-            <a:fillRect/>
-          </a:stretch>
-        </p:blipFill>
-        <p:spPr bwMode="auto">
-          <a:xfrm>
-            <a:off x="7517178" y="4897438"/>
-            <a:ext cx="1595437" cy="1595437"/>
-          </a:xfrm>
-          <a:prstGeom prst="rect">
-            <a:avLst/>
-          </a:prstGeom>
-          <a:noFill/>
-          <a:extLst>
-            <a:ext uri="{909E8E84-426E-40DD-AFC4-6F175D3DCCD1}">
-              <a14:hiddenFill xmlns:a14="http://schemas.microsoft.com/office/drawing/2010/main">
-                <a:solidFill>
-                  <a:srgbClr val="FFFFFF"/>
-                </a:solidFill>
-              </a14:hiddenFill>
-            </a:ext>
-          </a:extLst>
-        </p:spPr>
-      </p:pic>
-    </p:spTree>
-    <p:extLst>
-      <p:ext uri="{BB962C8B-B14F-4D97-AF65-F5344CB8AC3E}">
-        <p14:creationId xmlns:p14="http://schemas.microsoft.com/office/powerpoint/2010/main" val="2332471340"/>
-      </p:ext>
-    </p:extLst>
-  </p:cSld>
-  <p:clrMapOvr>
-    <a:masterClrMapping/>
-  </p:clrMapOvr>
-</p:sld>
-</file>
-
-<file path=ppt/slides/slide13.xml><?xml version="1.0" encoding="utf-8"?>
 <p:sld xmlns:a="http://schemas.openxmlformats.org/drawingml/2006/main" xmlns:r="http://schemas.openxmlformats.org/officeDocument/2006/relationships" xmlns:p="http://schemas.openxmlformats.org/presentationml/2006/main">
   <p:cSld>
     <p:spTree>
@@ -13835,6 +13303,14 @@
               <a:rPr lang="da-DK" dirty="0" err="1"/>
               <a:t>schema</a:t>
             </a:r>
+            <a:r>
+              <a:rPr lang="da-DK" dirty="0"/>
+              <a:t> under source </a:t>
+            </a:r>
+            <a:r>
+              <a:rPr lang="da-DK" dirty="0" err="1"/>
+              <a:t>control</a:t>
+            </a:r>
             <a:endParaRPr lang="da-DK" dirty="0"/>
           </a:p>
           <a:p>
@@ -13844,7 +13320,7 @@
             </a:r>
             <a:r>
               <a:rPr lang="da-DK" dirty="0"/>
-              <a:t> design and security </a:t>
+              <a:t> design, performance and security </a:t>
             </a:r>
             <a:r>
               <a:rPr lang="da-DK" dirty="0" err="1"/>
@@ -13951,7 +13427,7 @@
     </p:spTree>
     <p:extLst>
       <p:ext uri="{BB962C8B-B14F-4D97-AF65-F5344CB8AC3E}">
-        <p14:creationId xmlns:p14="http://schemas.microsoft.com/office/powerpoint/2010/main" val="3970507168"/>
+        <p14:creationId xmlns:p14="http://schemas.microsoft.com/office/powerpoint/2010/main" val="2126355379"/>
       </p:ext>
     </p:extLst>
   </p:cSld>
@@ -13961,7 +13437,601 @@
 </p:sld>
 </file>
 
-<file path=ppt/slides/slide2.xml><?xml version="1.0" encoding="utf-8"?>
+<file path=ppt/slides/slide11.xml><?xml version="1.0" encoding="utf-8"?>
+<p:sld xmlns:a="http://schemas.openxmlformats.org/drawingml/2006/main" xmlns:r="http://schemas.openxmlformats.org/officeDocument/2006/relationships" xmlns:p="http://schemas.openxmlformats.org/presentationml/2006/main">
+  <p:cSld>
+    <p:bg>
+      <p:bgPr>
+        <a:solidFill>
+          <a:schemeClr val="bg1"/>
+        </a:solidFill>
+        <a:effectLst/>
+      </p:bgPr>
+    </p:bg>
+    <p:spTree>
+      <p:nvGrpSpPr>
+        <p:cNvPr id="1" name=""/>
+        <p:cNvGrpSpPr/>
+        <p:nvPr/>
+      </p:nvGrpSpPr>
+      <p:grpSpPr>
+        <a:xfrm>
+          <a:off x="0" y="0"/>
+          <a:ext cx="0" cy="0"/>
+          <a:chOff x="0" y="0"/>
+          <a:chExt cx="0" cy="0"/>
+        </a:xfrm>
+      </p:grpSpPr>
+      <p:sp useBgFill="1">
+        <p:nvSpPr>
+          <p:cNvPr id="10" name="Rectangle 9">
+            <a:extLst>
+              <a:ext uri="{FF2B5EF4-FFF2-40B4-BE49-F238E27FC236}">
+                <a16:creationId xmlns:a16="http://schemas.microsoft.com/office/drawing/2014/main" id="{743AA782-23D1-4521-8CAD-47662984AA08}"/>
+              </a:ext>
+              <a:ext uri="{C183D7F6-B498-43B3-948B-1728B52AA6E4}">
+                <adec:decorative xmlns:adec="http://schemas.microsoft.com/office/drawing/2017/decorative" val="1"/>
+              </a:ext>
+            </a:extLst>
+          </p:cNvPr>
+          <p:cNvSpPr>
+            <a:spLocks noGrp="1" noRot="1" noChangeAspect="1" noMove="1" noResize="1" noEditPoints="1" noAdjustHandles="1" noChangeArrowheads="1" noChangeShapeType="1" noTextEdit="1"/>
+          </p:cNvSpPr>
+          <p:nvPr>
+            <p:extLst>
+              <p:ext uri="{386F3935-93C4-4BCD-93E2-E3B085C9AB24}">
+                <p16:designElem xmlns:p16="http://schemas.microsoft.com/office/powerpoint/2015/main" val="1"/>
+              </p:ext>
+            </p:extLst>
+          </p:nvPr>
+        </p:nvSpPr>
+        <p:spPr>
+          <a:xfrm>
+            <a:off x="0" y="0"/>
+            <a:ext cx="12192000" cy="6858000"/>
+          </a:xfrm>
+          <a:prstGeom prst="rect">
+            <a:avLst/>
+          </a:prstGeom>
+          <a:ln>
+            <a:noFill/>
+          </a:ln>
+        </p:spPr>
+        <p:style>
+          <a:lnRef idx="2">
+            <a:schemeClr val="accent1">
+              <a:shade val="50000"/>
+            </a:schemeClr>
+          </a:lnRef>
+          <a:fillRef idx="1">
+            <a:schemeClr val="accent1"/>
+          </a:fillRef>
+          <a:effectRef idx="0">
+            <a:schemeClr val="accent1"/>
+          </a:effectRef>
+          <a:fontRef idx="minor">
+            <a:schemeClr val="lt1"/>
+          </a:fontRef>
+        </p:style>
+        <p:txBody>
+          <a:bodyPr rtlCol="0" anchor="ctr"/>
+          <a:lstStyle/>
+          <a:p>
+            <a:pPr algn="ctr"/>
+            <a:endParaRPr lang="en-US"/>
+          </a:p>
+        </p:txBody>
+      </p:sp>
+      <p:sp>
+        <p:nvSpPr>
+          <p:cNvPr id="2" name="Title 1">
+            <a:extLst>
+              <a:ext uri="{FF2B5EF4-FFF2-40B4-BE49-F238E27FC236}">
+                <a16:creationId xmlns:a16="http://schemas.microsoft.com/office/drawing/2014/main" id="{852AC18E-06F7-297B-4A55-D3F36AEDEDBD}"/>
+              </a:ext>
+            </a:extLst>
+          </p:cNvPr>
+          <p:cNvSpPr>
+            <a:spLocks noGrp="1"/>
+          </p:cNvSpPr>
+          <p:nvPr>
+            <p:ph type="title"/>
+          </p:nvPr>
+        </p:nvSpPr>
+        <p:spPr>
+          <a:xfrm>
+            <a:off x="630936" y="640080"/>
+            <a:ext cx="4818888" cy="1481328"/>
+          </a:xfrm>
+        </p:spPr>
+        <p:txBody>
+          <a:bodyPr anchor="b">
+            <a:normAutofit/>
+          </a:bodyPr>
+          <a:lstStyle/>
+          <a:p>
+            <a:r>
+              <a:rPr lang="da-DK" sz="5400"/>
+              <a:t>CTA</a:t>
+            </a:r>
+          </a:p>
+        </p:txBody>
+      </p:sp>
+      <p:sp>
+        <p:nvSpPr>
+          <p:cNvPr id="12" name="sketch line">
+            <a:extLst>
+              <a:ext uri="{FF2B5EF4-FFF2-40B4-BE49-F238E27FC236}">
+                <a16:creationId xmlns:a16="http://schemas.microsoft.com/office/drawing/2014/main" id="{71877DBC-BB60-40F0-AC93-2ACDBAAE60CE}"/>
+              </a:ext>
+              <a:ext uri="{C183D7F6-B498-43B3-948B-1728B52AA6E4}">
+                <adec:decorative xmlns:adec="http://schemas.microsoft.com/office/drawing/2017/decorative" val="1"/>
+              </a:ext>
+            </a:extLst>
+          </p:cNvPr>
+          <p:cNvSpPr>
+            <a:spLocks noGrp="1" noRot="1" noChangeAspect="1" noMove="1" noResize="1" noEditPoints="1" noAdjustHandles="1" noChangeArrowheads="1" noChangeShapeType="1" noTextEdit="1"/>
+          </p:cNvSpPr>
+          <p:nvPr>
+            <p:extLst>
+              <p:ext uri="{386F3935-93C4-4BCD-93E2-E3B085C9AB24}">
+                <p16:designElem xmlns:p16="http://schemas.microsoft.com/office/powerpoint/2015/main" val="1"/>
+              </p:ext>
+            </p:extLst>
+          </p:nvPr>
+        </p:nvSpPr>
+        <p:spPr>
+          <a:xfrm>
+            <a:off x="643278" y="2372868"/>
+            <a:ext cx="3255095" cy="18288"/>
+          </a:xfrm>
+          <a:custGeom>
+            <a:avLst/>
+            <a:gdLst>
+              <a:gd name="connsiteX0" fmla="*/ 0 w 3255095"/>
+              <a:gd name="connsiteY0" fmla="*/ 0 h 18288"/>
+              <a:gd name="connsiteX1" fmla="*/ 618468 w 3255095"/>
+              <a:gd name="connsiteY1" fmla="*/ 0 h 18288"/>
+              <a:gd name="connsiteX2" fmla="*/ 1269487 w 3255095"/>
+              <a:gd name="connsiteY2" fmla="*/ 0 h 18288"/>
+              <a:gd name="connsiteX3" fmla="*/ 1953057 w 3255095"/>
+              <a:gd name="connsiteY3" fmla="*/ 0 h 18288"/>
+              <a:gd name="connsiteX4" fmla="*/ 2636627 w 3255095"/>
+              <a:gd name="connsiteY4" fmla="*/ 0 h 18288"/>
+              <a:gd name="connsiteX5" fmla="*/ 3255095 w 3255095"/>
+              <a:gd name="connsiteY5" fmla="*/ 0 h 18288"/>
+              <a:gd name="connsiteX6" fmla="*/ 3255095 w 3255095"/>
+              <a:gd name="connsiteY6" fmla="*/ 18288 h 18288"/>
+              <a:gd name="connsiteX7" fmla="*/ 2538974 w 3255095"/>
+              <a:gd name="connsiteY7" fmla="*/ 18288 h 18288"/>
+              <a:gd name="connsiteX8" fmla="*/ 1822853 w 3255095"/>
+              <a:gd name="connsiteY8" fmla="*/ 18288 h 18288"/>
+              <a:gd name="connsiteX9" fmla="*/ 1171834 w 3255095"/>
+              <a:gd name="connsiteY9" fmla="*/ 18288 h 18288"/>
+              <a:gd name="connsiteX10" fmla="*/ 0 w 3255095"/>
+              <a:gd name="connsiteY10" fmla="*/ 18288 h 18288"/>
+              <a:gd name="connsiteX11" fmla="*/ 0 w 3255095"/>
+              <a:gd name="connsiteY11" fmla="*/ 0 h 18288"/>
+            </a:gdLst>
+            <a:ahLst/>
+            <a:cxnLst>
+              <a:cxn ang="0">
+                <a:pos x="connsiteX0" y="connsiteY0"/>
+              </a:cxn>
+              <a:cxn ang="0">
+                <a:pos x="connsiteX1" y="connsiteY1"/>
+              </a:cxn>
+              <a:cxn ang="0">
+                <a:pos x="connsiteX2" y="connsiteY2"/>
+              </a:cxn>
+              <a:cxn ang="0">
+                <a:pos x="connsiteX3" y="connsiteY3"/>
+              </a:cxn>
+              <a:cxn ang="0">
+                <a:pos x="connsiteX4" y="connsiteY4"/>
+              </a:cxn>
+              <a:cxn ang="0">
+                <a:pos x="connsiteX5" y="connsiteY5"/>
+              </a:cxn>
+              <a:cxn ang="0">
+                <a:pos x="connsiteX6" y="connsiteY6"/>
+              </a:cxn>
+              <a:cxn ang="0">
+                <a:pos x="connsiteX7" y="connsiteY7"/>
+              </a:cxn>
+              <a:cxn ang="0">
+                <a:pos x="connsiteX8" y="connsiteY8"/>
+              </a:cxn>
+              <a:cxn ang="0">
+                <a:pos x="connsiteX9" y="connsiteY9"/>
+              </a:cxn>
+              <a:cxn ang="0">
+                <a:pos x="connsiteX10" y="connsiteY10"/>
+              </a:cxn>
+              <a:cxn ang="0">
+                <a:pos x="connsiteX11" y="connsiteY11"/>
+              </a:cxn>
+            </a:cxnLst>
+            <a:rect l="l" t="t" r="r" b="b"/>
+            <a:pathLst>
+              <a:path w="3255095" h="18288" fill="none" extrusionOk="0">
+                <a:moveTo>
+                  <a:pt x="0" y="0"/>
+                </a:moveTo>
+                <a:cubicBezTo>
+                  <a:pt x="240201" y="-22123"/>
+                  <a:pt x="462021" y="-19623"/>
+                  <a:pt x="618468" y="0"/>
+                </a:cubicBezTo>
+                <a:cubicBezTo>
+                  <a:pt x="774915" y="19623"/>
+                  <a:pt x="974734" y="2035"/>
+                  <a:pt x="1269487" y="0"/>
+                </a:cubicBezTo>
+                <a:cubicBezTo>
+                  <a:pt x="1564240" y="-2035"/>
+                  <a:pt x="1733579" y="10639"/>
+                  <a:pt x="1953057" y="0"/>
+                </a:cubicBezTo>
+                <a:cubicBezTo>
+                  <a:pt x="2172535" y="-10639"/>
+                  <a:pt x="2453962" y="14018"/>
+                  <a:pt x="2636627" y="0"/>
+                </a:cubicBezTo>
+                <a:cubicBezTo>
+                  <a:pt x="2819292" y="-14018"/>
+                  <a:pt x="3121375" y="5399"/>
+                  <a:pt x="3255095" y="0"/>
+                </a:cubicBezTo>
+                <a:cubicBezTo>
+                  <a:pt x="3254386" y="8157"/>
+                  <a:pt x="3254682" y="12125"/>
+                  <a:pt x="3255095" y="18288"/>
+                </a:cubicBezTo>
+                <a:cubicBezTo>
+                  <a:pt x="3088545" y="23203"/>
+                  <a:pt x="2687475" y="7419"/>
+                  <a:pt x="2538974" y="18288"/>
+                </a:cubicBezTo>
+                <a:cubicBezTo>
+                  <a:pt x="2390473" y="29157"/>
+                  <a:pt x="2137381" y="-8959"/>
+                  <a:pt x="1822853" y="18288"/>
+                </a:cubicBezTo>
+                <a:cubicBezTo>
+                  <a:pt x="1508325" y="45535"/>
+                  <a:pt x="1466437" y="20385"/>
+                  <a:pt x="1171834" y="18288"/>
+                </a:cubicBezTo>
+                <a:cubicBezTo>
+                  <a:pt x="877231" y="16191"/>
+                  <a:pt x="561097" y="37643"/>
+                  <a:pt x="0" y="18288"/>
+                </a:cubicBezTo>
+                <a:cubicBezTo>
+                  <a:pt x="-46" y="12483"/>
+                  <a:pt x="-203" y="6491"/>
+                  <a:pt x="0" y="0"/>
+                </a:cubicBezTo>
+                <a:close/>
+              </a:path>
+              <a:path w="3255095" h="18288" stroke="0" extrusionOk="0">
+                <a:moveTo>
+                  <a:pt x="0" y="0"/>
+                </a:moveTo>
+                <a:cubicBezTo>
+                  <a:pt x="291965" y="19429"/>
+                  <a:pt x="363155" y="8568"/>
+                  <a:pt x="618468" y="0"/>
+                </a:cubicBezTo>
+                <a:cubicBezTo>
+                  <a:pt x="873781" y="-8568"/>
+                  <a:pt x="904459" y="-19505"/>
+                  <a:pt x="1171834" y="0"/>
+                </a:cubicBezTo>
+                <a:cubicBezTo>
+                  <a:pt x="1439209" y="19505"/>
+                  <a:pt x="1744369" y="9790"/>
+                  <a:pt x="1887955" y="0"/>
+                </a:cubicBezTo>
+                <a:cubicBezTo>
+                  <a:pt x="2031541" y="-9790"/>
+                  <a:pt x="2346378" y="21240"/>
+                  <a:pt x="2506423" y="0"/>
+                </a:cubicBezTo>
+                <a:cubicBezTo>
+                  <a:pt x="2666468" y="-21240"/>
+                  <a:pt x="2990257" y="30414"/>
+                  <a:pt x="3255095" y="0"/>
+                </a:cubicBezTo>
+                <a:cubicBezTo>
+                  <a:pt x="3254831" y="4493"/>
+                  <a:pt x="3255479" y="9472"/>
+                  <a:pt x="3255095" y="18288"/>
+                </a:cubicBezTo>
+                <a:cubicBezTo>
+                  <a:pt x="3120743" y="16690"/>
+                  <a:pt x="2759628" y="42462"/>
+                  <a:pt x="2604076" y="18288"/>
+                </a:cubicBezTo>
+                <a:cubicBezTo>
+                  <a:pt x="2448524" y="-5886"/>
+                  <a:pt x="2184336" y="19599"/>
+                  <a:pt x="1887955" y="18288"/>
+                </a:cubicBezTo>
+                <a:cubicBezTo>
+                  <a:pt x="1591574" y="16977"/>
+                  <a:pt x="1548845" y="6870"/>
+                  <a:pt x="1334589" y="18288"/>
+                </a:cubicBezTo>
+                <a:cubicBezTo>
+                  <a:pt x="1120333" y="29706"/>
+                  <a:pt x="996014" y="9662"/>
+                  <a:pt x="683570" y="18288"/>
+                </a:cubicBezTo>
+                <a:cubicBezTo>
+                  <a:pt x="371126" y="26914"/>
+                  <a:pt x="198687" y="16167"/>
+                  <a:pt x="0" y="18288"/>
+                </a:cubicBezTo>
+                <a:cubicBezTo>
+                  <a:pt x="843" y="9577"/>
+                  <a:pt x="371" y="6900"/>
+                  <a:pt x="0" y="0"/>
+                </a:cubicBezTo>
+                <a:close/>
+              </a:path>
+            </a:pathLst>
+          </a:custGeom>
+          <a:solidFill>
+            <a:schemeClr val="accent2"/>
+          </a:solidFill>
+          <a:ln w="38100" cap="rnd">
+            <a:solidFill>
+              <a:schemeClr val="accent2"/>
+            </a:solidFill>
+            <a:round/>
+            <a:extLst>
+              <a:ext uri="{C807C97D-BFC1-408E-A445-0C87EB9F89A2}">
+                <ask:lineSketchStyleProps xmlns:ask="http://schemas.microsoft.com/office/drawing/2018/sketchyshapes" sd="1219033472">
+                  <a:prstGeom prst="rect">
+                    <a:avLst/>
+                  </a:prstGeom>
+                  <ask:type>
+                    <ask:lineSketchFreehand/>
+                  </ask:type>
+                </ask:lineSketchStyleProps>
+              </a:ext>
+            </a:extLst>
+          </a:ln>
+        </p:spPr>
+        <p:style>
+          <a:lnRef idx="2">
+            <a:schemeClr val="accent1">
+              <a:shade val="50000"/>
+            </a:schemeClr>
+          </a:lnRef>
+          <a:fillRef idx="1">
+            <a:schemeClr val="accent1"/>
+          </a:fillRef>
+          <a:effectRef idx="0">
+            <a:schemeClr val="accent1"/>
+          </a:effectRef>
+          <a:fontRef idx="minor">
+            <a:schemeClr val="lt1"/>
+          </a:fontRef>
+        </p:style>
+        <p:txBody>
+          <a:bodyPr rtlCol="0" anchor="ctr"/>
+          <a:lstStyle/>
+          <a:p>
+            <a:pPr algn="ctr"/>
+            <a:endParaRPr lang="en-US"/>
+          </a:p>
+        </p:txBody>
+      </p:sp>
+      <p:sp>
+        <p:nvSpPr>
+          <p:cNvPr id="3" name="Content Placeholder 2">
+            <a:extLst>
+              <a:ext uri="{FF2B5EF4-FFF2-40B4-BE49-F238E27FC236}">
+                <a16:creationId xmlns:a16="http://schemas.microsoft.com/office/drawing/2014/main" id="{98B6C42F-8CB3-FB57-D11C-4033DD156FEC}"/>
+              </a:ext>
+            </a:extLst>
+          </p:cNvPr>
+          <p:cNvSpPr>
+            <a:spLocks noGrp="1"/>
+          </p:cNvSpPr>
+          <p:nvPr>
+            <p:ph idx="1"/>
+          </p:nvPr>
+        </p:nvSpPr>
+        <p:spPr>
+          <a:xfrm>
+            <a:off x="630936" y="2660904"/>
+            <a:ext cx="6122202" cy="3547872"/>
+          </a:xfrm>
+        </p:spPr>
+        <p:txBody>
+          <a:bodyPr anchor="t">
+            <a:normAutofit/>
+          </a:bodyPr>
+          <a:lstStyle/>
+          <a:p>
+            <a:r>
+              <a:rPr lang="da-DK" sz="2200" dirty="0" err="1"/>
+              <a:t>Add</a:t>
+            </a:r>
+            <a:r>
+              <a:rPr lang="da-DK" sz="2200" dirty="0"/>
+              <a:t> </a:t>
+            </a:r>
+            <a:r>
+              <a:rPr lang="da-DK" sz="2200" dirty="0" err="1"/>
+              <a:t>you</a:t>
+            </a:r>
+            <a:r>
+              <a:rPr lang="da-DK" sz="2200" dirty="0"/>
+              <a:t> database </a:t>
+            </a:r>
+            <a:r>
+              <a:rPr lang="da-DK" sz="2200" dirty="0" err="1"/>
+              <a:t>schema</a:t>
+            </a:r>
+            <a:r>
+              <a:rPr lang="da-DK" sz="2200" dirty="0"/>
+              <a:t> to source </a:t>
+            </a:r>
+            <a:r>
+              <a:rPr lang="da-DK" sz="2200" dirty="0" err="1"/>
+              <a:t>control</a:t>
+            </a:r>
+            <a:endParaRPr lang="da-DK" sz="2200" dirty="0"/>
+          </a:p>
+          <a:p>
+            <a:r>
+              <a:rPr lang="da-DK" sz="2200" dirty="0" err="1"/>
+              <a:t>Enable</a:t>
+            </a:r>
+            <a:r>
+              <a:rPr lang="da-DK" sz="2200" dirty="0"/>
+              <a:t> </a:t>
+            </a:r>
+            <a:r>
+              <a:rPr lang="da-DK" sz="2200" dirty="0" err="1"/>
+              <a:t>code</a:t>
+            </a:r>
+            <a:r>
+              <a:rPr lang="da-DK" sz="2200" dirty="0"/>
+              <a:t> </a:t>
+            </a:r>
+            <a:r>
+              <a:rPr lang="da-DK" sz="2200" dirty="0" err="1"/>
+              <a:t>analysis</a:t>
+            </a:r>
+            <a:r>
+              <a:rPr lang="da-DK" sz="2200" dirty="0"/>
+              <a:t> </a:t>
+            </a:r>
+            <a:r>
+              <a:rPr lang="da-DK" sz="2200" dirty="0" err="1"/>
+              <a:t>locally</a:t>
+            </a:r>
+            <a:r>
+              <a:rPr lang="da-DK" sz="2200" dirty="0"/>
+              <a:t> and in CI</a:t>
+            </a:r>
+          </a:p>
+          <a:p>
+            <a:r>
+              <a:rPr lang="da-DK" sz="2200" dirty="0" err="1"/>
+              <a:t>Optional</a:t>
+            </a:r>
+            <a:r>
+              <a:rPr lang="da-DK" sz="2200" dirty="0"/>
+              <a:t>: </a:t>
+            </a:r>
+            <a:r>
+              <a:rPr lang="da-DK" sz="2200" dirty="0" err="1"/>
+              <a:t>Create</a:t>
+            </a:r>
+            <a:r>
+              <a:rPr lang="da-DK" sz="2200" dirty="0"/>
+              <a:t> </a:t>
+            </a:r>
+            <a:r>
+              <a:rPr lang="da-DK" sz="2200" dirty="0" err="1"/>
+              <a:t>your</a:t>
+            </a:r>
+            <a:r>
+              <a:rPr lang="da-DK" sz="2200" dirty="0"/>
+              <a:t> </a:t>
+            </a:r>
+            <a:r>
+              <a:rPr lang="da-DK" sz="2200" dirty="0" err="1"/>
+              <a:t>own</a:t>
+            </a:r>
+            <a:r>
+              <a:rPr lang="da-DK" sz="2200" dirty="0"/>
+              <a:t> </a:t>
+            </a:r>
+            <a:r>
+              <a:rPr lang="da-DK" sz="2200" dirty="0" err="1"/>
+              <a:t>rules</a:t>
+            </a:r>
+            <a:r>
+              <a:rPr lang="da-DK" sz="2200" dirty="0"/>
+              <a:t> and </a:t>
+            </a:r>
+            <a:r>
+              <a:rPr lang="da-DK" sz="2200" dirty="0" err="1"/>
+              <a:t>contribute</a:t>
+            </a:r>
+            <a:r>
+              <a:rPr lang="da-DK" sz="2200" dirty="0"/>
+              <a:t> </a:t>
+            </a:r>
+            <a:r>
+              <a:rPr lang="da-DK" sz="2200" dirty="0" err="1"/>
+              <a:t>them</a:t>
+            </a:r>
+            <a:r>
+              <a:rPr lang="da-DK" sz="2200" dirty="0"/>
+              <a:t> back to the community</a:t>
+            </a:r>
+          </a:p>
+          <a:p>
+            <a:r>
+              <a:rPr lang="da-DK" sz="2200" dirty="0"/>
+              <a:t>Q &amp; A</a:t>
+            </a:r>
+          </a:p>
+        </p:txBody>
+      </p:sp>
+      <p:pic>
+        <p:nvPicPr>
+          <p:cNvPr id="5" name="Picture 4" descr="A qr code with black dots&#10;&#10;Description automatically generated">
+            <a:extLst>
+              <a:ext uri="{FF2B5EF4-FFF2-40B4-BE49-F238E27FC236}">
+                <a16:creationId xmlns:a16="http://schemas.microsoft.com/office/drawing/2014/main" id="{1ACEDAF7-1A70-3E40-9618-12BBF5CB9F25}"/>
+              </a:ext>
+            </a:extLst>
+          </p:cNvPr>
+          <p:cNvPicPr>
+            <a:picLocks noChangeAspect="1"/>
+          </p:cNvPicPr>
+          <p:nvPr/>
+        </p:nvPicPr>
+        <p:blipFill>
+          <a:blip r:embed="rId2"/>
+          <a:stretch>
+            <a:fillRect/>
+          </a:stretch>
+        </p:blipFill>
+        <p:spPr>
+          <a:xfrm>
+            <a:off x="6862194" y="904031"/>
+            <a:ext cx="4695822" cy="4343974"/>
+          </a:xfrm>
+          <a:prstGeom prst="rect">
+            <a:avLst/>
+          </a:prstGeom>
+        </p:spPr>
+      </p:pic>
+    </p:spTree>
+    <p:extLst>
+      <p:ext uri="{BB962C8B-B14F-4D97-AF65-F5344CB8AC3E}">
+        <p14:creationId xmlns:p14="http://schemas.microsoft.com/office/powerpoint/2010/main" val="1406646759"/>
+      </p:ext>
+    </p:extLst>
+  </p:cSld>
+  <p:clrMapOvr>
+    <a:masterClrMapping/>
+  </p:clrMapOvr>
+</p:sld>
+</file>
+
+<file path=ppt/slides/slide12.xml><?xml version="1.0" encoding="utf-8"?>
 <p:sld xmlns:a="http://schemas.openxmlformats.org/drawingml/2006/main" xmlns:r="http://schemas.openxmlformats.org/officeDocument/2006/relationships" xmlns:p="http://schemas.openxmlformats.org/presentationml/2006/main">
   <p:cSld>
     <p:spTree>
@@ -13983,195 +14053,7 @@
           <p:cNvPr id="2" name="Title 1">
             <a:extLst>
               <a:ext uri="{FF2B5EF4-FFF2-40B4-BE49-F238E27FC236}">
-                <a16:creationId xmlns:a16="http://schemas.microsoft.com/office/drawing/2014/main" id="{4CBEFEE1-ED9F-6A86-7898-3DD3D0AF7949}"/>
-              </a:ext>
-            </a:extLst>
-          </p:cNvPr>
-          <p:cNvSpPr>
-            <a:spLocks noGrp="1"/>
-          </p:cNvSpPr>
-          <p:nvPr>
-            <p:ph type="title"/>
-          </p:nvPr>
-        </p:nvSpPr>
-        <p:spPr/>
-        <p:txBody>
-          <a:bodyPr/>
-          <a:lstStyle/>
-          <a:p>
-            <a:r>
-              <a:rPr lang="da-DK" dirty="0" err="1"/>
-              <a:t>Why</a:t>
-            </a:r>
-            <a:r>
-              <a:rPr lang="da-DK" dirty="0"/>
-              <a:t> </a:t>
-            </a:r>
-            <a:r>
-              <a:rPr lang="da-DK" dirty="0" err="1"/>
-              <a:t>fun</a:t>
-            </a:r>
-            <a:r>
-              <a:rPr lang="da-DK" dirty="0"/>
-              <a:t>? </a:t>
-            </a:r>
-            <a:r>
-              <a:rPr lang="da-DK" dirty="0" err="1"/>
-              <a:t>Why</a:t>
-            </a:r>
-            <a:r>
-              <a:rPr lang="da-DK" dirty="0"/>
-              <a:t> profit?</a:t>
-            </a:r>
-          </a:p>
-        </p:txBody>
-      </p:sp>
-      <p:sp>
-        <p:nvSpPr>
-          <p:cNvPr id="3" name="Content Placeholder 2">
-            <a:extLst>
-              <a:ext uri="{FF2B5EF4-FFF2-40B4-BE49-F238E27FC236}">
-                <a16:creationId xmlns:a16="http://schemas.microsoft.com/office/drawing/2014/main" id="{9CAE6B23-3C42-0472-5CA7-DEA0377C2567}"/>
-              </a:ext>
-            </a:extLst>
-          </p:cNvPr>
-          <p:cNvSpPr>
-            <a:spLocks noGrp="1"/>
-          </p:cNvSpPr>
-          <p:nvPr>
-            <p:ph idx="1"/>
-          </p:nvPr>
-        </p:nvSpPr>
-        <p:spPr/>
-        <p:txBody>
-          <a:bodyPr/>
-          <a:lstStyle/>
-          <a:p>
-            <a:r>
-              <a:rPr lang="da-DK" dirty="0"/>
-              <a:t>Fun is learning new </a:t>
-            </a:r>
-            <a:r>
-              <a:rPr lang="da-DK" dirty="0" err="1"/>
-              <a:t>things</a:t>
-            </a:r>
-            <a:r>
-              <a:rPr lang="da-DK" dirty="0"/>
-              <a:t> </a:t>
-            </a:r>
-            <a:r>
-              <a:rPr lang="da-DK" dirty="0" err="1"/>
-              <a:t>that</a:t>
-            </a:r>
-            <a:r>
-              <a:rPr lang="da-DK" dirty="0"/>
-              <a:t> </a:t>
-            </a:r>
-            <a:r>
-              <a:rPr lang="da-DK" dirty="0" err="1"/>
-              <a:t>add</a:t>
-            </a:r>
-            <a:r>
-              <a:rPr lang="da-DK" dirty="0"/>
-              <a:t> </a:t>
-            </a:r>
-            <a:r>
-              <a:rPr lang="da-DK" dirty="0" err="1"/>
-              <a:t>value</a:t>
-            </a:r>
-            <a:endParaRPr lang="da-DK" dirty="0"/>
-          </a:p>
-          <a:p>
-            <a:r>
-              <a:rPr lang="da-DK" dirty="0"/>
-              <a:t>Profit is </a:t>
-            </a:r>
-            <a:r>
-              <a:rPr lang="da-DK" dirty="0" err="1"/>
-              <a:t>shifting</a:t>
-            </a:r>
-            <a:r>
-              <a:rPr lang="da-DK" dirty="0"/>
-              <a:t> </a:t>
-            </a:r>
-            <a:r>
-              <a:rPr lang="da-DK" dirty="0" err="1"/>
-              <a:t>left</a:t>
-            </a:r>
-            <a:endParaRPr lang="da-DK" dirty="0"/>
-          </a:p>
-          <a:p>
-            <a:r>
-              <a:rPr lang="da-DK" dirty="0" err="1"/>
-              <a:t>Shifting</a:t>
-            </a:r>
-            <a:r>
-              <a:rPr lang="da-DK" dirty="0"/>
-              <a:t> </a:t>
-            </a:r>
-            <a:r>
-              <a:rPr lang="da-DK" dirty="0" err="1"/>
-              <a:t>left</a:t>
-            </a:r>
-            <a:r>
-              <a:rPr lang="da-DK" dirty="0"/>
-              <a:t> is </a:t>
-            </a:r>
-            <a:r>
-              <a:rPr lang="da-DK" dirty="0" err="1"/>
-              <a:t>expert</a:t>
-            </a:r>
-            <a:r>
-              <a:rPr lang="da-DK" dirty="0"/>
-              <a:t> </a:t>
-            </a:r>
-            <a:r>
-              <a:rPr lang="da-DK" dirty="0" err="1"/>
-              <a:t>help</a:t>
-            </a:r>
-            <a:r>
-              <a:rPr lang="da-DK" dirty="0"/>
-              <a:t> with database design</a:t>
-            </a:r>
-          </a:p>
-        </p:txBody>
-      </p:sp>
-    </p:spTree>
-    <p:extLst>
-      <p:ext uri="{BB962C8B-B14F-4D97-AF65-F5344CB8AC3E}">
-        <p14:creationId xmlns:p14="http://schemas.microsoft.com/office/powerpoint/2010/main" val="1616935625"/>
-      </p:ext>
-    </p:extLst>
-  </p:cSld>
-  <p:clrMapOvr>
-    <a:masterClrMapping/>
-  </p:clrMapOvr>
-</p:sld>
-</file>
-
-<file path=ppt/slides/slide3.xml><?xml version="1.0" encoding="utf-8"?>
-<p:sld xmlns:a="http://schemas.openxmlformats.org/drawingml/2006/main" xmlns:r="http://schemas.openxmlformats.org/officeDocument/2006/relationships" xmlns:p="http://schemas.openxmlformats.org/presentationml/2006/main">
-  <p:cSld>
-    <p:spTree>
-      <p:nvGrpSpPr>
-        <p:cNvPr id="1" name=""/>
-        <p:cNvGrpSpPr/>
-        <p:nvPr/>
-      </p:nvGrpSpPr>
-      <p:grpSpPr>
-        <a:xfrm>
-          <a:off x="0" y="0"/>
-          <a:ext cx="0" cy="0"/>
-          <a:chOff x="0" y="0"/>
-          <a:chExt cx="0" cy="0"/>
-        </a:xfrm>
-      </p:grpSpPr>
-      <p:sp>
-        <p:nvSpPr>
-          <p:cNvPr id="2" name="Title 1">
-            <a:extLst>
-              <a:ext uri="{FF2B5EF4-FFF2-40B4-BE49-F238E27FC236}">
-                <a16:creationId xmlns:a16="http://schemas.microsoft.com/office/drawing/2014/main" id="{46764B13-08C2-5DF8-A53C-BFEC16E91C07}"/>
+                <a16:creationId xmlns:a16="http://schemas.microsoft.com/office/drawing/2014/main" id="{B6E02EDD-BF75-C1E2-C4E0-452E278B9E12}"/>
               </a:ext>
             </a:extLst>
           </p:cNvPr>
@@ -14188,8 +14070,44 @@
           <a:lstStyle/>
           <a:p>
             <a:r>
+              <a:rPr lang="da-DK" dirty="0" err="1"/>
+              <a:t>What</a:t>
+            </a:r>
+            <a:r>
               <a:rPr lang="da-DK" dirty="0"/>
-              <a:t>Demo!</a:t>
+              <a:t> is a </a:t>
+            </a:r>
+            <a:r>
+              <a:rPr lang="da-DK" dirty="0" err="1"/>
+              <a:t>dacpac</a:t>
+            </a:r>
+            <a:r>
+              <a:rPr lang="da-DK" dirty="0"/>
+              <a:t> and </a:t>
+            </a:r>
+            <a:r>
+              <a:rPr lang="da-DK" dirty="0" err="1"/>
+              <a:t>why</a:t>
+            </a:r>
+            <a:r>
+              <a:rPr lang="da-DK" dirty="0"/>
+              <a:t> </a:t>
+            </a:r>
+            <a:r>
+              <a:rPr lang="da-DK" dirty="0" err="1"/>
+              <a:t>should</a:t>
+            </a:r>
+            <a:r>
+              <a:rPr lang="da-DK" dirty="0"/>
+              <a:t> I </a:t>
+            </a:r>
+            <a:r>
+              <a:rPr lang="da-DK" dirty="0" err="1"/>
+              <a:t>care</a:t>
+            </a:r>
+            <a:r>
+              <a:rPr lang="da-DK" dirty="0"/>
+              <a:t>?</a:t>
             </a:r>
           </a:p>
         </p:txBody>
@@ -14199,7 +14117,7 @@
           <p:cNvPr id="3" name="Subtitle 2">
             <a:extLst>
               <a:ext uri="{FF2B5EF4-FFF2-40B4-BE49-F238E27FC236}">
-                <a16:creationId xmlns:a16="http://schemas.microsoft.com/office/drawing/2014/main" id="{9DD93DD9-B1CE-0839-4E42-138D918D6D97}"/>
+                <a16:creationId xmlns:a16="http://schemas.microsoft.com/office/drawing/2014/main" id="{FC34CC98-5EC0-A5E9-F6EC-E0FF61BD140B}"/>
               </a:ext>
             </a:extLst>
           </p:cNvPr>
@@ -14222,7 +14140,7 @@
     </p:spTree>
     <p:extLst>
       <p:ext uri="{BB962C8B-B14F-4D97-AF65-F5344CB8AC3E}">
-        <p14:creationId xmlns:p14="http://schemas.microsoft.com/office/powerpoint/2010/main" val="41144073"/>
+        <p14:creationId xmlns:p14="http://schemas.microsoft.com/office/powerpoint/2010/main" val="3361272730"/>
       </p:ext>
     </p:extLst>
   </p:cSld>
@@ -14232,7 +14150,7 @@
 </p:sld>
 </file>
 
-<file path=ppt/slides/slide4.xml><?xml version="1.0" encoding="utf-8"?>
+<file path=ppt/slides/slide13.xml><?xml version="1.0" encoding="utf-8"?>
 <p:sld xmlns:a="http://schemas.openxmlformats.org/drawingml/2006/main" xmlns:r="http://schemas.openxmlformats.org/officeDocument/2006/relationships" xmlns:p="http://schemas.openxmlformats.org/presentationml/2006/main">
   <p:cSld>
     <p:bg>
@@ -14472,6 +14390,960 @@
 </p:sld>
 </file>
 
+<file path=ppt/slides/slide14.xml><?xml version="1.0" encoding="utf-8"?>
+<p:sld xmlns:a="http://schemas.openxmlformats.org/drawingml/2006/main" xmlns:r="http://schemas.openxmlformats.org/officeDocument/2006/relationships" xmlns:p="http://schemas.openxmlformats.org/presentationml/2006/main">
+  <p:cSld>
+    <p:spTree>
+      <p:nvGrpSpPr>
+        <p:cNvPr id="1" name=""/>
+        <p:cNvGrpSpPr/>
+        <p:nvPr/>
+      </p:nvGrpSpPr>
+      <p:grpSpPr>
+        <a:xfrm>
+          <a:off x="0" y="0"/>
+          <a:ext cx="0" cy="0"/>
+          <a:chOff x="0" y="0"/>
+          <a:chExt cx="0" cy="0"/>
+        </a:xfrm>
+      </p:grpSpPr>
+      <p:sp>
+        <p:nvSpPr>
+          <p:cNvPr id="2" name="Title 1">
+            <a:extLst>
+              <a:ext uri="{FF2B5EF4-FFF2-40B4-BE49-F238E27FC236}">
+                <a16:creationId xmlns:a16="http://schemas.microsoft.com/office/drawing/2014/main" id="{83C2E1C5-9DBD-026F-54AD-8267C48752C3}"/>
+              </a:ext>
+            </a:extLst>
+          </p:cNvPr>
+          <p:cNvSpPr>
+            <a:spLocks noGrp="1"/>
+          </p:cNvSpPr>
+          <p:nvPr>
+            <p:ph type="title"/>
+          </p:nvPr>
+        </p:nvSpPr>
+        <p:spPr/>
+        <p:txBody>
+          <a:bodyPr/>
+          <a:lstStyle/>
+          <a:p>
+            <a:r>
+              <a:rPr lang="da-DK" dirty="0" err="1"/>
+              <a:t>Why</a:t>
+            </a:r>
+            <a:r>
+              <a:rPr lang="da-DK" dirty="0"/>
+              <a:t>?</a:t>
+            </a:r>
+          </a:p>
+        </p:txBody>
+      </p:sp>
+      <p:sp>
+        <p:nvSpPr>
+          <p:cNvPr id="3" name="Content Placeholder 2">
+            <a:extLst>
+              <a:ext uri="{FF2B5EF4-FFF2-40B4-BE49-F238E27FC236}">
+                <a16:creationId xmlns:a16="http://schemas.microsoft.com/office/drawing/2014/main" id="{FE1AEA13-D193-3591-483D-99C9CBEA719D}"/>
+              </a:ext>
+            </a:extLst>
+          </p:cNvPr>
+          <p:cNvSpPr>
+            <a:spLocks noGrp="1"/>
+          </p:cNvSpPr>
+          <p:nvPr>
+            <p:ph idx="1"/>
+          </p:nvPr>
+        </p:nvSpPr>
+        <p:spPr/>
+        <p:txBody>
+          <a:bodyPr>
+            <a:normAutofit fontScale="92500" lnSpcReduction="20000"/>
+          </a:bodyPr>
+          <a:lstStyle/>
+          <a:p>
+            <a:pPr marL="0" indent="0">
+              <a:buNone/>
+            </a:pPr>
+            <a:r>
+              <a:rPr lang="da-DK" b="0" i="0" dirty="0">
+                <a:solidFill>
+                  <a:srgbClr val="555555"/>
+                </a:solidFill>
+                <a:effectLst/>
+                <a:latin typeface="Open Sans" panose="020B0606030504020204" pitchFamily="34" charset="0"/>
+              </a:rPr>
+              <a:t>Data Tier Application Package</a:t>
+            </a:r>
+            <a:br>
+              <a:rPr lang="da-DK" b="0" i="0" dirty="0">
+                <a:solidFill>
+                  <a:srgbClr val="555555"/>
+                </a:solidFill>
+                <a:effectLst/>
+                <a:latin typeface="Open Sans" panose="020B0606030504020204" pitchFamily="34" charset="0"/>
+              </a:rPr>
+            </a:br>
+            <a:endParaRPr lang="da-DK" dirty="0"/>
+          </a:p>
+          <a:p>
+            <a:r>
+              <a:rPr lang="da-DK" sz="3200" dirty="0" err="1"/>
+              <a:t>Get</a:t>
+            </a:r>
+            <a:r>
+              <a:rPr lang="da-DK" sz="3200" dirty="0"/>
+              <a:t> </a:t>
+            </a:r>
+            <a:r>
+              <a:rPr lang="da-DK" sz="3200" dirty="0" err="1"/>
+              <a:t>your</a:t>
+            </a:r>
+            <a:r>
+              <a:rPr lang="da-DK" sz="3200" dirty="0"/>
+              <a:t> database under source </a:t>
+            </a:r>
+            <a:r>
+              <a:rPr lang="da-DK" sz="3200" dirty="0" err="1"/>
+              <a:t>control</a:t>
+            </a:r>
+            <a:endParaRPr lang="da-DK" sz="3200" dirty="0"/>
+          </a:p>
+          <a:p>
+            <a:r>
+              <a:rPr lang="da-DK" sz="3200" dirty="0" err="1"/>
+              <a:t>Ensure</a:t>
+            </a:r>
+            <a:r>
+              <a:rPr lang="da-DK" sz="3200" dirty="0"/>
+              <a:t> </a:t>
+            </a:r>
+            <a:r>
+              <a:rPr lang="da-DK" sz="3200" dirty="0" err="1"/>
+              <a:t>your</a:t>
+            </a:r>
+            <a:r>
+              <a:rPr lang="da-DK" sz="3200" dirty="0"/>
+              <a:t> .sql scripts ”</a:t>
+            </a:r>
+            <a:r>
+              <a:rPr lang="da-DK" sz="3200" dirty="0" err="1"/>
+              <a:t>build</a:t>
+            </a:r>
+            <a:r>
+              <a:rPr lang="da-DK" sz="3200" dirty="0"/>
+              <a:t>” – </a:t>
+            </a:r>
+            <a:r>
+              <a:rPr lang="da-DK" sz="3200" dirty="0" err="1"/>
+              <a:t>code</a:t>
+            </a:r>
+            <a:r>
+              <a:rPr lang="da-DK" sz="3200" dirty="0"/>
+              <a:t> </a:t>
+            </a:r>
+            <a:r>
+              <a:rPr lang="da-DK" sz="3200" dirty="0" err="1"/>
+              <a:t>validation</a:t>
+            </a:r>
+            <a:endParaRPr lang="da-DK" sz="3200" dirty="0"/>
+          </a:p>
+          <a:p>
+            <a:r>
+              <a:rPr lang="da-DK" sz="3200" dirty="0" err="1"/>
+              <a:t>Ensure</a:t>
+            </a:r>
+            <a:r>
+              <a:rPr lang="da-DK" sz="3200" dirty="0"/>
+              <a:t> </a:t>
+            </a:r>
+            <a:r>
+              <a:rPr lang="da-DK" sz="3200" dirty="0" err="1"/>
+              <a:t>your</a:t>
+            </a:r>
+            <a:r>
+              <a:rPr lang="da-DK" sz="3200" dirty="0"/>
+              <a:t> .sql scripts </a:t>
+            </a:r>
+            <a:r>
+              <a:rPr lang="da-DK" sz="3200" dirty="0" err="1"/>
+              <a:t>follow</a:t>
+            </a:r>
+            <a:r>
+              <a:rPr lang="da-DK" sz="3200" dirty="0"/>
+              <a:t> business </a:t>
+            </a:r>
+            <a:r>
+              <a:rPr lang="da-DK" sz="3200" dirty="0" err="1"/>
+              <a:t>rules</a:t>
+            </a:r>
+            <a:r>
+              <a:rPr lang="da-DK" sz="3200" dirty="0"/>
+              <a:t> – </a:t>
+            </a:r>
+            <a:r>
+              <a:rPr lang="da-DK" sz="3200" dirty="0" err="1"/>
+              <a:t>code</a:t>
+            </a:r>
+            <a:r>
+              <a:rPr lang="da-DK" sz="3200" dirty="0"/>
+              <a:t> </a:t>
+            </a:r>
+            <a:r>
+              <a:rPr lang="da-DK" sz="3200" dirty="0" err="1"/>
+              <a:t>analysis</a:t>
+            </a:r>
+            <a:endParaRPr lang="da-DK" sz="3200" dirty="0"/>
+          </a:p>
+          <a:p>
+            <a:r>
+              <a:rPr lang="da-DK" sz="3200" dirty="0" err="1"/>
+              <a:t>Deploy</a:t>
+            </a:r>
+            <a:r>
+              <a:rPr lang="da-DK" sz="3200" dirty="0"/>
+              <a:t> </a:t>
+            </a:r>
+            <a:r>
+              <a:rPr lang="da-DK" sz="3200" dirty="0" err="1"/>
+              <a:t>changes</a:t>
+            </a:r>
+            <a:r>
+              <a:rPr lang="da-DK" sz="3200" dirty="0"/>
+              <a:t> to the database </a:t>
+            </a:r>
+            <a:r>
+              <a:rPr lang="da-DK" sz="3200" dirty="0" err="1"/>
+              <a:t>schema</a:t>
+            </a:r>
+            <a:r>
+              <a:rPr lang="da-DK" sz="3200" dirty="0"/>
+              <a:t> with </a:t>
+            </a:r>
+            <a:r>
+              <a:rPr lang="da-DK" sz="3200" dirty="0" err="1"/>
+              <a:t>changes</a:t>
+            </a:r>
+            <a:r>
+              <a:rPr lang="da-DK" sz="3200" dirty="0"/>
+              <a:t> to </a:t>
+            </a:r>
+            <a:r>
+              <a:rPr lang="da-DK" sz="3200" dirty="0" err="1"/>
+              <a:t>your</a:t>
+            </a:r>
+            <a:r>
+              <a:rPr lang="da-DK" sz="3200" dirty="0"/>
+              <a:t> app</a:t>
+            </a:r>
+          </a:p>
+          <a:p>
+            <a:r>
+              <a:rPr lang="da-DK" sz="3200" dirty="0"/>
+              <a:t>No more migration scripts – </a:t>
+            </a:r>
+            <a:r>
+              <a:rPr lang="da-DK" sz="3200" dirty="0" err="1"/>
+              <a:t>simply</a:t>
+            </a:r>
+            <a:r>
+              <a:rPr lang="da-DK" sz="3200" dirty="0"/>
+              <a:t> </a:t>
+            </a:r>
+            <a:r>
+              <a:rPr lang="da-DK" sz="3200" dirty="0" err="1"/>
+              <a:t>describe</a:t>
+            </a:r>
+            <a:r>
+              <a:rPr lang="da-DK" sz="3200" dirty="0"/>
+              <a:t> </a:t>
+            </a:r>
+            <a:r>
+              <a:rPr lang="da-DK" sz="3200" dirty="0" err="1"/>
+              <a:t>your</a:t>
+            </a:r>
+            <a:r>
+              <a:rPr lang="da-DK" sz="3200" dirty="0"/>
+              <a:t> </a:t>
+            </a:r>
+            <a:r>
+              <a:rPr lang="da-DK" sz="3200" dirty="0" err="1"/>
+              <a:t>desired</a:t>
+            </a:r>
+            <a:r>
+              <a:rPr lang="da-DK" sz="3200" dirty="0"/>
+              <a:t> </a:t>
+            </a:r>
+            <a:r>
+              <a:rPr lang="da-DK" sz="3200" dirty="0" err="1"/>
+              <a:t>state</a:t>
+            </a:r>
+            <a:endParaRPr lang="da-DK" sz="3200" dirty="0"/>
+          </a:p>
+          <a:p>
+            <a:r>
+              <a:rPr lang="da-DK" sz="3200" dirty="0"/>
+              <a:t>Cross platform </a:t>
+            </a:r>
+            <a:r>
+              <a:rPr lang="da-DK" sz="3200" dirty="0" err="1"/>
+              <a:t>build</a:t>
+            </a:r>
+            <a:r>
+              <a:rPr lang="da-DK" sz="3200" dirty="0"/>
+              <a:t> and </a:t>
+            </a:r>
+            <a:r>
+              <a:rPr lang="da-DK" sz="3200" dirty="0" err="1"/>
+              <a:t>deployment</a:t>
+            </a:r>
+            <a:r>
+              <a:rPr lang="da-DK" sz="3200" dirty="0"/>
+              <a:t> support</a:t>
+            </a:r>
+          </a:p>
+          <a:p>
+            <a:pPr marL="0" indent="0">
+              <a:buNone/>
+            </a:pPr>
+            <a:endParaRPr lang="da-DK" sz="3200" dirty="0"/>
+          </a:p>
+        </p:txBody>
+      </p:sp>
+    </p:spTree>
+    <p:extLst>
+      <p:ext uri="{BB962C8B-B14F-4D97-AF65-F5344CB8AC3E}">
+        <p14:creationId xmlns:p14="http://schemas.microsoft.com/office/powerpoint/2010/main" val="2807965468"/>
+      </p:ext>
+    </p:extLst>
+  </p:cSld>
+  <p:clrMapOvr>
+    <a:masterClrMapping/>
+  </p:clrMapOvr>
+</p:sld>
+</file>
+
+<file path=ppt/slides/slide15.xml><?xml version="1.0" encoding="utf-8"?>
+<p:sld xmlns:a="http://schemas.openxmlformats.org/drawingml/2006/main" xmlns:r="http://schemas.openxmlformats.org/officeDocument/2006/relationships" xmlns:p="http://schemas.openxmlformats.org/presentationml/2006/main">
+  <p:cSld>
+    <p:spTree>
+      <p:nvGrpSpPr>
+        <p:cNvPr id="1" name=""/>
+        <p:cNvGrpSpPr/>
+        <p:nvPr/>
+      </p:nvGrpSpPr>
+      <p:grpSpPr>
+        <a:xfrm>
+          <a:off x="0" y="0"/>
+          <a:ext cx="0" cy="0"/>
+          <a:chOff x="0" y="0"/>
+          <a:chExt cx="0" cy="0"/>
+        </a:xfrm>
+      </p:grpSpPr>
+      <p:sp>
+        <p:nvSpPr>
+          <p:cNvPr id="2" name="Title 1">
+            <a:extLst>
+              <a:ext uri="{FF2B5EF4-FFF2-40B4-BE49-F238E27FC236}">
+                <a16:creationId xmlns:a16="http://schemas.microsoft.com/office/drawing/2014/main" id="{B0D5BB5B-7FFA-DB8B-F802-03B5D520D180}"/>
+              </a:ext>
+            </a:extLst>
+          </p:cNvPr>
+          <p:cNvSpPr>
+            <a:spLocks noGrp="1"/>
+          </p:cNvSpPr>
+          <p:nvPr>
+            <p:ph type="title"/>
+          </p:nvPr>
+        </p:nvSpPr>
+        <p:spPr/>
+        <p:txBody>
+          <a:bodyPr/>
+          <a:lstStyle/>
+          <a:p>
+            <a:r>
+              <a:rPr lang="da-DK" dirty="0" err="1"/>
+              <a:t>Process</a:t>
+            </a:r>
+            <a:endParaRPr lang="da-DK" dirty="0"/>
+          </a:p>
+        </p:txBody>
+      </p:sp>
+      <p:graphicFrame>
+        <p:nvGraphicFramePr>
+          <p:cNvPr id="4" name="Content Placeholder 3">
+            <a:extLst>
+              <a:ext uri="{FF2B5EF4-FFF2-40B4-BE49-F238E27FC236}">
+                <a16:creationId xmlns:a16="http://schemas.microsoft.com/office/drawing/2014/main" id="{14C458CB-FE86-0722-5465-2135D8B24067}"/>
+              </a:ext>
+            </a:extLst>
+          </p:cNvPr>
+          <p:cNvGraphicFramePr>
+            <a:graphicFrameLocks noGrp="1"/>
+          </p:cNvGraphicFramePr>
+          <p:nvPr>
+            <p:ph idx="1"/>
+          </p:nvPr>
+        </p:nvGraphicFramePr>
+        <p:xfrm>
+          <a:off x="838200" y="1825625"/>
+          <a:ext cx="10515600" cy="4351338"/>
+        </p:xfrm>
+        <a:graphic>
+          <a:graphicData uri="http://schemas.openxmlformats.org/drawingml/2006/diagram">
+            <dgm:relIds xmlns:dgm="http://schemas.openxmlformats.org/drawingml/2006/diagram" xmlns:r="http://schemas.openxmlformats.org/officeDocument/2006/relationships" r:dm="rId2" r:lo="rId3" r:qs="rId4" r:cs="rId5"/>
+          </a:graphicData>
+        </a:graphic>
+      </p:graphicFrame>
+      <p:sp>
+        <p:nvSpPr>
+          <p:cNvPr id="3" name="Arrow: Down 2">
+            <a:extLst>
+              <a:ext uri="{FF2B5EF4-FFF2-40B4-BE49-F238E27FC236}">
+                <a16:creationId xmlns:a16="http://schemas.microsoft.com/office/drawing/2014/main" id="{41A997FB-CF39-A7D3-CBE9-49B7A0E95D4B}"/>
+              </a:ext>
+            </a:extLst>
+          </p:cNvPr>
+          <p:cNvSpPr/>
+          <p:nvPr/>
+        </p:nvSpPr>
+        <p:spPr>
+          <a:xfrm>
+            <a:off x="8072581" y="2161309"/>
+            <a:ext cx="484632" cy="978408"/>
+          </a:xfrm>
+          <a:prstGeom prst="downArrow">
+            <a:avLst/>
+          </a:prstGeom>
+        </p:spPr>
+        <p:style>
+          <a:lnRef idx="2">
+            <a:schemeClr val="accent1">
+              <a:shade val="50000"/>
+            </a:schemeClr>
+          </a:lnRef>
+          <a:fillRef idx="1">
+            <a:schemeClr val="accent1"/>
+          </a:fillRef>
+          <a:effectRef idx="0">
+            <a:schemeClr val="accent1"/>
+          </a:effectRef>
+          <a:fontRef idx="minor">
+            <a:schemeClr val="lt1"/>
+          </a:fontRef>
+        </p:style>
+        <p:txBody>
+          <a:bodyPr rtlCol="0" anchor="ctr"/>
+          <a:lstStyle/>
+          <a:p>
+            <a:pPr algn="ctr"/>
+            <a:endParaRPr lang="da-DK"/>
+          </a:p>
+        </p:txBody>
+      </p:sp>
+      <p:pic>
+        <p:nvPicPr>
+          <p:cNvPr id="1026" name="Picture 2" descr="Microscope Cartoon Vector Icon Illustration - Microscope - Sticker |  TeePublic">
+            <a:extLst>
+              <a:ext uri="{FF2B5EF4-FFF2-40B4-BE49-F238E27FC236}">
+                <a16:creationId xmlns:a16="http://schemas.microsoft.com/office/drawing/2014/main" id="{0C12428C-43EA-42B3-B5FD-98F46FCED002}"/>
+              </a:ext>
+            </a:extLst>
+          </p:cNvPr>
+          <p:cNvPicPr>
+            <a:picLocks noChangeAspect="1" noChangeArrowheads="1"/>
+          </p:cNvPicPr>
+          <p:nvPr/>
+        </p:nvPicPr>
+        <p:blipFill>
+          <a:blip r:embed="rId7">
+            <a:extLst>
+              <a:ext uri="{28A0092B-C50C-407E-A947-70E740481C1C}">
+                <a14:useLocalDpi xmlns:a14="http://schemas.microsoft.com/office/drawing/2010/main" val="0"/>
+              </a:ext>
+            </a:extLst>
+          </a:blip>
+          <a:srcRect/>
+          <a:stretch>
+            <a:fillRect/>
+          </a:stretch>
+        </p:blipFill>
+        <p:spPr bwMode="auto">
+          <a:xfrm>
+            <a:off x="7517178" y="4897438"/>
+            <a:ext cx="1595437" cy="1595437"/>
+          </a:xfrm>
+          <a:prstGeom prst="rect">
+            <a:avLst/>
+          </a:prstGeom>
+          <a:noFill/>
+          <a:extLst>
+            <a:ext uri="{909E8E84-426E-40DD-AFC4-6F175D3DCCD1}">
+              <a14:hiddenFill xmlns:a14="http://schemas.microsoft.com/office/drawing/2010/main">
+                <a:solidFill>
+                  <a:srgbClr val="FFFFFF"/>
+                </a:solidFill>
+              </a14:hiddenFill>
+            </a:ext>
+          </a:extLst>
+        </p:spPr>
+      </p:pic>
+    </p:spTree>
+    <p:extLst>
+      <p:ext uri="{BB962C8B-B14F-4D97-AF65-F5344CB8AC3E}">
+        <p14:creationId xmlns:p14="http://schemas.microsoft.com/office/powerpoint/2010/main" val="2332471340"/>
+      </p:ext>
+    </p:extLst>
+  </p:cSld>
+  <p:clrMapOvr>
+    <a:masterClrMapping/>
+  </p:clrMapOvr>
+</p:sld>
+</file>
+
+<file path=ppt/slides/slide2.xml><?xml version="1.0" encoding="utf-8"?>
+<p:sld xmlns:a="http://schemas.openxmlformats.org/drawingml/2006/main" xmlns:r="http://schemas.openxmlformats.org/officeDocument/2006/relationships" xmlns:p="http://schemas.openxmlformats.org/presentationml/2006/main">
+  <p:cSld>
+    <p:spTree>
+      <p:nvGrpSpPr>
+        <p:cNvPr id="1" name="">
+          <a:extLst>
+            <a:ext uri="{FF2B5EF4-FFF2-40B4-BE49-F238E27FC236}">
+              <a16:creationId xmlns:a16="http://schemas.microsoft.com/office/drawing/2014/main" id="{177060DA-856A-346A-7C68-17AEA45BB0C3}"/>
+            </a:ext>
+          </a:extLst>
+        </p:cNvPr>
+        <p:cNvGrpSpPr/>
+        <p:nvPr/>
+      </p:nvGrpSpPr>
+      <p:grpSpPr>
+        <a:xfrm>
+          <a:off x="0" y="0"/>
+          <a:ext cx="0" cy="0"/>
+          <a:chOff x="0" y="0"/>
+          <a:chExt cx="0" cy="0"/>
+        </a:xfrm>
+      </p:grpSpPr>
+      <p:sp>
+        <p:nvSpPr>
+          <p:cNvPr id="2" name="Title 1">
+            <a:extLst>
+              <a:ext uri="{FF2B5EF4-FFF2-40B4-BE49-F238E27FC236}">
+                <a16:creationId xmlns:a16="http://schemas.microsoft.com/office/drawing/2014/main" id="{13FA188E-213F-A5EC-6918-4E29E048A570}"/>
+              </a:ext>
+            </a:extLst>
+          </p:cNvPr>
+          <p:cNvSpPr>
+            <a:spLocks noGrp="1"/>
+          </p:cNvSpPr>
+          <p:nvPr>
+            <p:ph type="title"/>
+          </p:nvPr>
+        </p:nvSpPr>
+        <p:spPr/>
+        <p:txBody>
+          <a:bodyPr/>
+          <a:lstStyle/>
+          <a:p>
+            <a:r>
+              <a:rPr lang="da-DK" dirty="0"/>
+              <a:t>Challenges?</a:t>
+            </a:r>
+          </a:p>
+        </p:txBody>
+      </p:sp>
+      <p:sp>
+        <p:nvSpPr>
+          <p:cNvPr id="3" name="Content Placeholder 2">
+            <a:extLst>
+              <a:ext uri="{FF2B5EF4-FFF2-40B4-BE49-F238E27FC236}">
+                <a16:creationId xmlns:a16="http://schemas.microsoft.com/office/drawing/2014/main" id="{3F9A231C-4780-226B-D583-D673A9555BE5}"/>
+              </a:ext>
+            </a:extLst>
+          </p:cNvPr>
+          <p:cNvSpPr>
+            <a:spLocks noGrp="1"/>
+          </p:cNvSpPr>
+          <p:nvPr>
+            <p:ph idx="1"/>
+          </p:nvPr>
+        </p:nvSpPr>
+        <p:spPr/>
+        <p:txBody>
+          <a:bodyPr>
+            <a:normAutofit/>
+          </a:bodyPr>
+          <a:lstStyle/>
+          <a:p>
+            <a:r>
+              <a:rPr lang="da-DK" sz="3200" dirty="0"/>
+              <a:t>Database </a:t>
+            </a:r>
+            <a:r>
+              <a:rPr lang="da-DK" sz="3200" dirty="0" err="1"/>
+              <a:t>schema</a:t>
+            </a:r>
+            <a:r>
+              <a:rPr lang="da-DK" sz="3200" dirty="0"/>
+              <a:t> not in source </a:t>
+            </a:r>
+            <a:r>
+              <a:rPr lang="da-DK" sz="3200" dirty="0" err="1"/>
+              <a:t>control</a:t>
+            </a:r>
+            <a:r>
+              <a:rPr lang="da-DK" sz="3200" dirty="0"/>
+              <a:t>?</a:t>
+            </a:r>
+          </a:p>
+          <a:p>
+            <a:r>
+              <a:rPr lang="da-DK" sz="3200" dirty="0" err="1"/>
+              <a:t>Complex</a:t>
+            </a:r>
+            <a:r>
+              <a:rPr lang="da-DK" sz="3200" dirty="0"/>
+              <a:t> scripts to </a:t>
+            </a:r>
+            <a:r>
+              <a:rPr lang="da-DK" sz="3200" dirty="0" err="1"/>
+              <a:t>update</a:t>
+            </a:r>
+            <a:r>
+              <a:rPr lang="da-DK" sz="3200" dirty="0"/>
+              <a:t> </a:t>
+            </a:r>
+            <a:r>
+              <a:rPr lang="da-DK" sz="3200" dirty="0" err="1"/>
+              <a:t>schema</a:t>
+            </a:r>
+            <a:endParaRPr lang="da-DK" sz="3200" dirty="0"/>
+          </a:p>
+          <a:p>
+            <a:r>
+              <a:rPr lang="da-DK" sz="3200" dirty="0"/>
+              <a:t>Versioning of database </a:t>
+            </a:r>
+            <a:r>
+              <a:rPr lang="da-DK" sz="3200" dirty="0" err="1"/>
+              <a:t>vs</a:t>
+            </a:r>
+            <a:r>
+              <a:rPr lang="da-DK" sz="3200" dirty="0"/>
+              <a:t> app a nightmare</a:t>
+            </a:r>
+          </a:p>
+          <a:p>
+            <a:r>
+              <a:rPr lang="da-DK" sz="3200" dirty="0"/>
+              <a:t>Runtime </a:t>
+            </a:r>
+            <a:r>
+              <a:rPr lang="da-DK" sz="3200" dirty="0" err="1"/>
+              <a:t>errors</a:t>
+            </a:r>
+            <a:r>
+              <a:rPr lang="da-DK" sz="3200" dirty="0"/>
+              <a:t> in database due to </a:t>
+            </a:r>
+            <a:r>
+              <a:rPr lang="da-DK" sz="3200" dirty="0" err="1"/>
+              <a:t>syntax</a:t>
+            </a:r>
+            <a:r>
+              <a:rPr lang="da-DK" sz="3200" dirty="0"/>
+              <a:t> </a:t>
+            </a:r>
+            <a:r>
+              <a:rPr lang="da-DK" sz="3200" dirty="0" err="1"/>
+              <a:t>errors</a:t>
+            </a:r>
+            <a:endParaRPr lang="da-DK" sz="3200" dirty="0"/>
+          </a:p>
+          <a:p>
+            <a:r>
+              <a:rPr lang="da-DK" sz="3200" dirty="0"/>
+              <a:t>No standard approach to </a:t>
+            </a:r>
+            <a:r>
+              <a:rPr lang="da-DK" sz="3200" dirty="0" err="1"/>
+              <a:t>naming</a:t>
+            </a:r>
+            <a:r>
+              <a:rPr lang="da-DK" sz="3200" dirty="0"/>
+              <a:t> or </a:t>
+            </a:r>
+            <a:r>
+              <a:rPr lang="da-DK" sz="3200" dirty="0" err="1"/>
+              <a:t>other</a:t>
+            </a:r>
+            <a:r>
+              <a:rPr lang="da-DK" sz="3200" dirty="0"/>
+              <a:t> database design ”business </a:t>
+            </a:r>
+            <a:r>
+              <a:rPr lang="da-DK" sz="3200" dirty="0" err="1"/>
+              <a:t>rules</a:t>
+            </a:r>
+            <a:r>
+              <a:rPr lang="da-DK" sz="3200" dirty="0"/>
+              <a:t>”</a:t>
+            </a:r>
+          </a:p>
+          <a:p>
+            <a:r>
+              <a:rPr lang="da-DK" sz="3200" dirty="0"/>
+              <a:t>Cross platform </a:t>
+            </a:r>
+            <a:r>
+              <a:rPr lang="da-DK" sz="3200" dirty="0" err="1"/>
+              <a:t>build</a:t>
+            </a:r>
+            <a:r>
+              <a:rPr lang="da-DK" sz="3200" dirty="0"/>
+              <a:t> and </a:t>
+            </a:r>
+            <a:r>
+              <a:rPr lang="da-DK" sz="3200" dirty="0" err="1"/>
+              <a:t>deployment</a:t>
+            </a:r>
+            <a:r>
+              <a:rPr lang="da-DK" sz="3200" dirty="0"/>
+              <a:t> support (</a:t>
+            </a:r>
+            <a:r>
+              <a:rPr lang="da-DK" sz="3200" dirty="0" err="1"/>
+              <a:t>if</a:t>
+            </a:r>
+            <a:r>
+              <a:rPr lang="da-DK" sz="3200" dirty="0"/>
+              <a:t> </a:t>
+            </a:r>
+            <a:r>
+              <a:rPr lang="da-DK" sz="3200" dirty="0" err="1"/>
+              <a:t>you</a:t>
+            </a:r>
+            <a:r>
+              <a:rPr lang="da-DK" sz="3200" dirty="0"/>
+              <a:t> have a </a:t>
+            </a:r>
+            <a:r>
+              <a:rPr lang="da-DK" sz="3200" dirty="0" err="1"/>
+              <a:t>classic</a:t>
+            </a:r>
+            <a:r>
+              <a:rPr lang="da-DK" sz="3200" dirty="0"/>
+              <a:t> .</a:t>
+            </a:r>
+            <a:r>
+              <a:rPr lang="da-DK" sz="3200" dirty="0" err="1"/>
+              <a:t>sqlproj</a:t>
+            </a:r>
+            <a:r>
+              <a:rPr lang="da-DK" sz="3200" dirty="0"/>
+              <a:t>)</a:t>
+            </a:r>
+          </a:p>
+          <a:p>
+            <a:pPr marL="0" indent="0">
+              <a:buNone/>
+            </a:pPr>
+            <a:endParaRPr lang="da-DK" sz="3200" dirty="0"/>
+          </a:p>
+        </p:txBody>
+      </p:sp>
+    </p:spTree>
+    <p:extLst>
+      <p:ext uri="{BB962C8B-B14F-4D97-AF65-F5344CB8AC3E}">
+        <p14:creationId xmlns:p14="http://schemas.microsoft.com/office/powerpoint/2010/main" val="1404577621"/>
+      </p:ext>
+    </p:extLst>
+  </p:cSld>
+  <p:clrMapOvr>
+    <a:masterClrMapping/>
+  </p:clrMapOvr>
+</p:sld>
+</file>
+
+<file path=ppt/slides/slide3.xml><?xml version="1.0" encoding="utf-8"?>
+<p:sld xmlns:a="http://schemas.openxmlformats.org/drawingml/2006/main" xmlns:r="http://schemas.openxmlformats.org/officeDocument/2006/relationships" xmlns:p="http://schemas.openxmlformats.org/presentationml/2006/main">
+  <p:cSld>
+    <p:spTree>
+      <p:nvGrpSpPr>
+        <p:cNvPr id="1" name="">
+          <a:extLst>
+            <a:ext uri="{FF2B5EF4-FFF2-40B4-BE49-F238E27FC236}">
+              <a16:creationId xmlns:a16="http://schemas.microsoft.com/office/drawing/2014/main" id="{7934C9D9-B801-FE68-CA56-58B9DB1ED25E}"/>
+            </a:ext>
+          </a:extLst>
+        </p:cNvPr>
+        <p:cNvGrpSpPr/>
+        <p:nvPr/>
+      </p:nvGrpSpPr>
+      <p:grpSpPr>
+        <a:xfrm>
+          <a:off x="0" y="0"/>
+          <a:ext cx="0" cy="0"/>
+          <a:chOff x="0" y="0"/>
+          <a:chExt cx="0" cy="0"/>
+        </a:xfrm>
+      </p:grpSpPr>
+      <p:sp>
+        <p:nvSpPr>
+          <p:cNvPr id="2" name="Title 1">
+            <a:extLst>
+              <a:ext uri="{FF2B5EF4-FFF2-40B4-BE49-F238E27FC236}">
+                <a16:creationId xmlns:a16="http://schemas.microsoft.com/office/drawing/2014/main" id="{1F41D93A-130A-FC50-12E6-6D961A5B6B5C}"/>
+              </a:ext>
+            </a:extLst>
+          </p:cNvPr>
+          <p:cNvSpPr>
+            <a:spLocks noGrp="1"/>
+          </p:cNvSpPr>
+          <p:nvPr>
+            <p:ph type="ctrTitle"/>
+          </p:nvPr>
+        </p:nvSpPr>
+        <p:spPr/>
+        <p:txBody>
+          <a:bodyPr/>
+          <a:lstStyle/>
+          <a:p>
+            <a:r>
+              <a:rPr lang="da-DK" dirty="0"/>
+              <a:t>Demo!</a:t>
+            </a:r>
+          </a:p>
+        </p:txBody>
+      </p:sp>
+      <p:sp>
+        <p:nvSpPr>
+          <p:cNvPr id="3" name="Subtitle 2">
+            <a:extLst>
+              <a:ext uri="{FF2B5EF4-FFF2-40B4-BE49-F238E27FC236}">
+                <a16:creationId xmlns:a16="http://schemas.microsoft.com/office/drawing/2014/main" id="{8BEA287C-E0D9-3974-4E87-ED55F3C766B2}"/>
+              </a:ext>
+            </a:extLst>
+          </p:cNvPr>
+          <p:cNvSpPr>
+            <a:spLocks noGrp="1"/>
+          </p:cNvSpPr>
+          <p:nvPr>
+            <p:ph type="subTitle" idx="1"/>
+          </p:nvPr>
+        </p:nvSpPr>
+        <p:spPr/>
+        <p:txBody>
+          <a:bodyPr/>
+          <a:lstStyle/>
+          <a:p>
+            <a:endParaRPr lang="da-DK"/>
+          </a:p>
+        </p:txBody>
+      </p:sp>
+    </p:spTree>
+    <p:extLst>
+      <p:ext uri="{BB962C8B-B14F-4D97-AF65-F5344CB8AC3E}">
+        <p14:creationId xmlns:p14="http://schemas.microsoft.com/office/powerpoint/2010/main" val="2493589965"/>
+      </p:ext>
+    </p:extLst>
+  </p:cSld>
+  <p:clrMapOvr>
+    <a:masterClrMapping/>
+  </p:clrMapOvr>
+</p:sld>
+</file>
+
+<file path=ppt/slides/slide4.xml><?xml version="1.0" encoding="utf-8"?>
+<p:sld xmlns:a="http://schemas.openxmlformats.org/drawingml/2006/main" xmlns:r="http://schemas.openxmlformats.org/officeDocument/2006/relationships" xmlns:p="http://schemas.openxmlformats.org/presentationml/2006/main">
+  <p:cSld>
+    <p:spTree>
+      <p:nvGrpSpPr>
+        <p:cNvPr id="1" name=""/>
+        <p:cNvGrpSpPr/>
+        <p:nvPr/>
+      </p:nvGrpSpPr>
+      <p:grpSpPr>
+        <a:xfrm>
+          <a:off x="0" y="0"/>
+          <a:ext cx="0" cy="0"/>
+          <a:chOff x="0" y="0"/>
+          <a:chExt cx="0" cy="0"/>
+        </a:xfrm>
+      </p:grpSpPr>
+      <p:sp>
+        <p:nvSpPr>
+          <p:cNvPr id="2" name="Title 1">
+            <a:extLst>
+              <a:ext uri="{FF2B5EF4-FFF2-40B4-BE49-F238E27FC236}">
+                <a16:creationId xmlns:a16="http://schemas.microsoft.com/office/drawing/2014/main" id="{B0D5BB5B-7FFA-DB8B-F802-03B5D520D180}"/>
+              </a:ext>
+            </a:extLst>
+          </p:cNvPr>
+          <p:cNvSpPr>
+            <a:spLocks noGrp="1"/>
+          </p:cNvSpPr>
+          <p:nvPr>
+            <p:ph type="title"/>
+          </p:nvPr>
+        </p:nvSpPr>
+        <p:spPr/>
+        <p:txBody>
+          <a:bodyPr/>
+          <a:lstStyle/>
+          <a:p>
+            <a:r>
+              <a:rPr lang="da-DK" dirty="0" err="1"/>
+              <a:t>Process</a:t>
+            </a:r>
+            <a:endParaRPr lang="da-DK" dirty="0"/>
+          </a:p>
+        </p:txBody>
+      </p:sp>
+      <p:graphicFrame>
+        <p:nvGraphicFramePr>
+          <p:cNvPr id="4" name="Content Placeholder 3">
+            <a:extLst>
+              <a:ext uri="{FF2B5EF4-FFF2-40B4-BE49-F238E27FC236}">
+                <a16:creationId xmlns:a16="http://schemas.microsoft.com/office/drawing/2014/main" id="{14C458CB-FE86-0722-5465-2135D8B24067}"/>
+              </a:ext>
+            </a:extLst>
+          </p:cNvPr>
+          <p:cNvGraphicFramePr>
+            <a:graphicFrameLocks noGrp="1"/>
+          </p:cNvGraphicFramePr>
+          <p:nvPr>
+            <p:ph idx="1"/>
+            <p:extLst>
+              <p:ext uri="{D42A27DB-BD31-4B8C-83A1-F6EECF244321}">
+                <p14:modId xmlns:p14="http://schemas.microsoft.com/office/powerpoint/2010/main" val="681339126"/>
+              </p:ext>
+            </p:extLst>
+          </p:nvPr>
+        </p:nvGraphicFramePr>
+        <p:xfrm>
+          <a:off x="838200" y="1825625"/>
+          <a:ext cx="10515600" cy="4351338"/>
+        </p:xfrm>
+        <a:graphic>
+          <a:graphicData uri="http://schemas.openxmlformats.org/drawingml/2006/diagram">
+            <dgm:relIds xmlns:dgm="http://schemas.openxmlformats.org/drawingml/2006/diagram" xmlns:r="http://schemas.openxmlformats.org/officeDocument/2006/relationships" r:dm="rId2" r:lo="rId3" r:qs="rId4" r:cs="rId5"/>
+          </a:graphicData>
+        </a:graphic>
+      </p:graphicFrame>
+    </p:spTree>
+    <p:extLst>
+      <p:ext uri="{BB962C8B-B14F-4D97-AF65-F5344CB8AC3E}">
+        <p14:creationId xmlns:p14="http://schemas.microsoft.com/office/powerpoint/2010/main" val="2825632252"/>
+      </p:ext>
+    </p:extLst>
+  </p:cSld>
+  <p:clrMapOvr>
+    <a:masterClrMapping/>
+  </p:clrMapOvr>
+</p:sld>
+</file>
+
 <file path=ppt/slides/slide5.xml><?xml version="1.0" encoding="utf-8"?>
 <p:sld xmlns:a="http://schemas.openxmlformats.org/drawingml/2006/main" xmlns:r="http://schemas.openxmlformats.org/officeDocument/2006/relationships" xmlns:p="http://schemas.openxmlformats.org/presentationml/2006/main">
   <p:cSld>
@@ -14494,7 +15366,311 @@
           <p:cNvPr id="2" name="Title 1">
             <a:extLst>
               <a:ext uri="{FF2B5EF4-FFF2-40B4-BE49-F238E27FC236}">
-                <a16:creationId xmlns:a16="http://schemas.microsoft.com/office/drawing/2014/main" id="{B403F286-DD29-2236-7333-80878DDF851A}"/>
+                <a16:creationId xmlns:a16="http://schemas.microsoft.com/office/drawing/2014/main" id="{B0D5BB5B-7FFA-DB8B-F802-03B5D520D180}"/>
+              </a:ext>
+            </a:extLst>
+          </p:cNvPr>
+          <p:cNvSpPr>
+            <a:spLocks noGrp="1"/>
+          </p:cNvSpPr>
+          <p:nvPr>
+            <p:ph type="title"/>
+          </p:nvPr>
+        </p:nvSpPr>
+        <p:spPr/>
+        <p:txBody>
+          <a:bodyPr/>
+          <a:lstStyle/>
+          <a:p>
+            <a:r>
+              <a:rPr lang="da-DK" dirty="0" err="1"/>
+              <a:t>Tooling</a:t>
+            </a:r>
+            <a:endParaRPr lang="da-DK" dirty="0"/>
+          </a:p>
+        </p:txBody>
+      </p:sp>
+      <p:graphicFrame>
+        <p:nvGraphicFramePr>
+          <p:cNvPr id="4" name="Content Placeholder 3">
+            <a:extLst>
+              <a:ext uri="{FF2B5EF4-FFF2-40B4-BE49-F238E27FC236}">
+                <a16:creationId xmlns:a16="http://schemas.microsoft.com/office/drawing/2014/main" id="{14C458CB-FE86-0722-5465-2135D8B24067}"/>
+              </a:ext>
+            </a:extLst>
+          </p:cNvPr>
+          <p:cNvGraphicFramePr>
+            <a:graphicFrameLocks noGrp="1"/>
+          </p:cNvGraphicFramePr>
+          <p:nvPr>
+            <p:ph idx="1"/>
+            <p:extLst>
+              <p:ext uri="{D42A27DB-BD31-4B8C-83A1-F6EECF244321}">
+                <p14:modId xmlns:p14="http://schemas.microsoft.com/office/powerpoint/2010/main" val="2261826792"/>
+              </p:ext>
+            </p:extLst>
+          </p:nvPr>
+        </p:nvGraphicFramePr>
+        <p:xfrm>
+          <a:off x="838200" y="1825625"/>
+          <a:ext cx="10515600" cy="4351338"/>
+        </p:xfrm>
+        <a:graphic>
+          <a:graphicData uri="http://schemas.openxmlformats.org/drawingml/2006/diagram">
+            <dgm:relIds xmlns:dgm="http://schemas.openxmlformats.org/drawingml/2006/diagram" xmlns:r="http://schemas.openxmlformats.org/officeDocument/2006/relationships" r:dm="rId2" r:lo="rId3" r:qs="rId4" r:cs="rId5"/>
+          </a:graphicData>
+        </a:graphic>
+      </p:graphicFrame>
+      <p:sp>
+        <p:nvSpPr>
+          <p:cNvPr id="3" name="TextBox 2">
+            <a:extLst>
+              <a:ext uri="{FF2B5EF4-FFF2-40B4-BE49-F238E27FC236}">
+                <a16:creationId xmlns:a16="http://schemas.microsoft.com/office/drawing/2014/main" id="{D0002042-9439-C760-352C-9B1314C5F520}"/>
+              </a:ext>
+            </a:extLst>
+          </p:cNvPr>
+          <p:cNvSpPr txBox="1"/>
+          <p:nvPr/>
+        </p:nvSpPr>
+        <p:spPr>
+          <a:xfrm>
+            <a:off x="1297858" y="4739147"/>
+            <a:ext cx="2438400" cy="1200329"/>
+          </a:xfrm>
+          <a:prstGeom prst="rect">
+            <a:avLst/>
+          </a:prstGeom>
+          <a:noFill/>
+        </p:spPr>
+        <p:txBody>
+          <a:bodyPr wrap="square" rtlCol="0">
+            <a:spAutoFit/>
+          </a:bodyPr>
+          <a:lstStyle/>
+          <a:p>
+            <a:r>
+              <a:rPr lang="da-DK" dirty="0"/>
+              <a:t>Visual Studio</a:t>
+            </a:r>
+          </a:p>
+          <a:p>
+            <a:r>
+              <a:rPr lang="da-DK" dirty="0"/>
+              <a:t>VS Code</a:t>
+            </a:r>
+          </a:p>
+          <a:p>
+            <a:r>
+              <a:rPr lang="da-DK" dirty="0" err="1"/>
+              <a:t>sqlpackage</a:t>
+            </a:r>
+            <a:r>
+              <a:rPr lang="da-DK" dirty="0"/>
+              <a:t> </a:t>
+            </a:r>
+            <a:r>
+              <a:rPr lang="da-DK" dirty="0" err="1"/>
+              <a:t>extract</a:t>
+            </a:r>
+            <a:endParaRPr lang="da-DK" dirty="0"/>
+          </a:p>
+          <a:p>
+            <a:r>
+              <a:rPr lang="da-DK" dirty="0" err="1"/>
+              <a:t>dotnet</a:t>
+            </a:r>
+            <a:r>
+              <a:rPr lang="da-DK" dirty="0"/>
+              <a:t> new</a:t>
+            </a:r>
+          </a:p>
+        </p:txBody>
+      </p:sp>
+      <p:sp>
+        <p:nvSpPr>
+          <p:cNvPr id="5" name="TextBox 4">
+            <a:extLst>
+              <a:ext uri="{FF2B5EF4-FFF2-40B4-BE49-F238E27FC236}">
+                <a16:creationId xmlns:a16="http://schemas.microsoft.com/office/drawing/2014/main" id="{F736263C-7EC6-28BD-BD25-C6CFCC5126F2}"/>
+              </a:ext>
+            </a:extLst>
+          </p:cNvPr>
+          <p:cNvSpPr txBox="1"/>
+          <p:nvPr/>
+        </p:nvSpPr>
+        <p:spPr>
+          <a:xfrm>
+            <a:off x="5287302" y="4891547"/>
+            <a:ext cx="1600200" cy="1477328"/>
+          </a:xfrm>
+          <a:prstGeom prst="rect">
+            <a:avLst/>
+          </a:prstGeom>
+          <a:noFill/>
+        </p:spPr>
+        <p:txBody>
+          <a:bodyPr wrap="square" rtlCol="0">
+            <a:spAutoFit/>
+          </a:bodyPr>
+          <a:lstStyle/>
+          <a:p>
+            <a:r>
+              <a:rPr lang="da-DK" dirty="0" err="1"/>
+              <a:t>MSBuild</a:t>
+            </a:r>
+            <a:endParaRPr lang="da-DK" dirty="0"/>
+          </a:p>
+          <a:p>
+            <a:r>
+              <a:rPr lang="da-DK" dirty="0" err="1"/>
+              <a:t>dotnet</a:t>
+            </a:r>
+            <a:r>
+              <a:rPr lang="da-DK" dirty="0"/>
+              <a:t> </a:t>
+            </a:r>
+            <a:r>
+              <a:rPr lang="da-DK" dirty="0" err="1"/>
+              <a:t>build</a:t>
+            </a:r>
+            <a:endParaRPr lang="da-DK" dirty="0"/>
+          </a:p>
+          <a:p>
+            <a:r>
+              <a:rPr lang="da-DK" dirty="0" err="1"/>
+              <a:t>dotnet</a:t>
+            </a:r>
+            <a:r>
+              <a:rPr lang="da-DK" dirty="0"/>
+              <a:t> </a:t>
+            </a:r>
+            <a:r>
+              <a:rPr lang="da-DK" dirty="0" err="1"/>
+              <a:t>pack</a:t>
+            </a:r>
+            <a:br>
+              <a:rPr lang="da-DK" dirty="0"/>
+            </a:br>
+            <a:br>
+              <a:rPr lang="da-DK" dirty="0"/>
+            </a:br>
+            <a:r>
+              <a:rPr lang="da-DK" dirty="0"/>
+              <a:t>Analyzer </a:t>
+            </a:r>
+            <a:r>
+              <a:rPr lang="da-DK" dirty="0" err="1"/>
+              <a:t>rules</a:t>
+            </a:r>
+            <a:endParaRPr lang="da-DK" dirty="0"/>
+          </a:p>
+        </p:txBody>
+      </p:sp>
+      <p:sp>
+        <p:nvSpPr>
+          <p:cNvPr id="6" name="TextBox 5">
+            <a:extLst>
+              <a:ext uri="{FF2B5EF4-FFF2-40B4-BE49-F238E27FC236}">
+                <a16:creationId xmlns:a16="http://schemas.microsoft.com/office/drawing/2014/main" id="{58694100-CEF9-DF56-F98E-6A48126062C4}"/>
+              </a:ext>
+            </a:extLst>
+          </p:cNvPr>
+          <p:cNvSpPr txBox="1"/>
+          <p:nvPr/>
+        </p:nvSpPr>
+        <p:spPr>
+          <a:xfrm>
+            <a:off x="8681885" y="4798139"/>
+            <a:ext cx="2723556" cy="923330"/>
+          </a:xfrm>
+          <a:prstGeom prst="rect">
+            <a:avLst/>
+          </a:prstGeom>
+          <a:noFill/>
+        </p:spPr>
+        <p:txBody>
+          <a:bodyPr wrap="square" rtlCol="0">
+            <a:spAutoFit/>
+          </a:bodyPr>
+          <a:lstStyle/>
+          <a:p>
+            <a:r>
+              <a:rPr lang="da-DK" dirty="0" err="1"/>
+              <a:t>Azure</a:t>
+            </a:r>
+            <a:r>
+              <a:rPr lang="da-DK" dirty="0"/>
+              <a:t> </a:t>
+            </a:r>
+            <a:r>
+              <a:rPr lang="da-DK" dirty="0" err="1"/>
+              <a:t>DevOps</a:t>
+            </a:r>
+            <a:r>
+              <a:rPr lang="da-DK" dirty="0"/>
+              <a:t> pipelines</a:t>
+            </a:r>
+          </a:p>
+          <a:p>
+            <a:r>
+              <a:rPr lang="da-DK" dirty="0"/>
+              <a:t>GitHub actions</a:t>
+            </a:r>
+          </a:p>
+          <a:p>
+            <a:r>
+              <a:rPr lang="da-DK" dirty="0" err="1"/>
+              <a:t>sqlpackage</a:t>
+            </a:r>
+            <a:r>
+              <a:rPr lang="da-DK" dirty="0"/>
+              <a:t> </a:t>
+            </a:r>
+            <a:r>
+              <a:rPr lang="da-DK" dirty="0" err="1"/>
+              <a:t>publish</a:t>
+            </a:r>
+            <a:endParaRPr lang="da-DK" dirty="0"/>
+          </a:p>
+        </p:txBody>
+      </p:sp>
+    </p:spTree>
+    <p:extLst>
+      <p:ext uri="{BB962C8B-B14F-4D97-AF65-F5344CB8AC3E}">
+        <p14:creationId xmlns:p14="http://schemas.microsoft.com/office/powerpoint/2010/main" val="654303725"/>
+      </p:ext>
+    </p:extLst>
+  </p:cSld>
+  <p:clrMapOvr>
+    <a:masterClrMapping/>
+  </p:clrMapOvr>
+</p:sld>
+</file>
+
+<file path=ppt/slides/slide6.xml><?xml version="1.0" encoding="utf-8"?>
+<p:sld xmlns:a="http://schemas.openxmlformats.org/drawingml/2006/main" xmlns:r="http://schemas.openxmlformats.org/officeDocument/2006/relationships" xmlns:p="http://schemas.openxmlformats.org/presentationml/2006/main">
+  <p:cSld>
+    <p:spTree>
+      <p:nvGrpSpPr>
+        <p:cNvPr id="1" name=""/>
+        <p:cNvGrpSpPr/>
+        <p:nvPr/>
+      </p:nvGrpSpPr>
+      <p:grpSpPr>
+        <a:xfrm>
+          <a:off x="0" y="0"/>
+          <a:ext cx="0" cy="0"/>
+          <a:chOff x="0" y="0"/>
+          <a:chExt cx="0" cy="0"/>
+        </a:xfrm>
+      </p:grpSpPr>
+      <p:sp>
+        <p:nvSpPr>
+          <p:cNvPr id="2" name="Title 1">
+            <a:extLst>
+              <a:ext uri="{FF2B5EF4-FFF2-40B4-BE49-F238E27FC236}">
+                <a16:creationId xmlns:a16="http://schemas.microsoft.com/office/drawing/2014/main" id="{46764B13-08C2-5DF8-A53C-BFEC16E91C07}"/>
               </a:ext>
             </a:extLst>
           </p:cNvPr>
@@ -14522,7 +15698,7 @@
           <p:cNvPr id="3" name="Subtitle 2">
             <a:extLst>
               <a:ext uri="{FF2B5EF4-FFF2-40B4-BE49-F238E27FC236}">
-                <a16:creationId xmlns:a16="http://schemas.microsoft.com/office/drawing/2014/main" id="{95CCAF5C-CCCF-268A-263E-9FE1D91089E6}"/>
+                <a16:creationId xmlns:a16="http://schemas.microsoft.com/office/drawing/2014/main" id="{9DD93DD9-B1CE-0839-4E42-138D918D6D97}"/>
               </a:ext>
             </a:extLst>
           </p:cNvPr>
@@ -14545,7 +15721,7 @@
     </p:spTree>
     <p:extLst>
       <p:ext uri="{BB962C8B-B14F-4D97-AF65-F5344CB8AC3E}">
-        <p14:creationId xmlns:p14="http://schemas.microsoft.com/office/powerpoint/2010/main" val="3659650217"/>
+        <p14:creationId xmlns:p14="http://schemas.microsoft.com/office/powerpoint/2010/main" val="41144073"/>
       </p:ext>
     </p:extLst>
   </p:cSld>
@@ -14555,7 +15731,7 @@
 </p:sld>
 </file>
 
-<file path=ppt/slides/slide6.xml><?xml version="1.0" encoding="utf-8"?>
+<file path=ppt/slides/slide7.xml><?xml version="1.0" encoding="utf-8"?>
 <p:sld xmlns:a="http://schemas.openxmlformats.org/drawingml/2006/main" xmlns:r="http://schemas.openxmlformats.org/officeDocument/2006/relationships" xmlns:p="http://schemas.openxmlformats.org/presentationml/2006/main">
   <p:cSld>
     <p:spTree>
@@ -14629,7 +15805,7 @@
             <p:ph idx="1"/>
             <p:extLst>
               <p:ext uri="{D42A27DB-BD31-4B8C-83A1-F6EECF244321}">
-                <p14:modId xmlns:p14="http://schemas.microsoft.com/office/powerpoint/2010/main" val="639805679"/>
+                <p14:modId xmlns:p14="http://schemas.microsoft.com/office/powerpoint/2010/main" val="1709445855"/>
               </p:ext>
             </p:extLst>
           </p:nvPr>
@@ -14685,15 +15861,7 @@
                     <a:p>
                       <a:r>
                         <a:rPr lang="da-DK" sz="1800" dirty="0"/>
-                        <a:t>.SQLPROJ (DB </a:t>
-                      </a:r>
-                      <a:r>
-                        <a:rPr lang="da-DK" sz="1800" dirty="0" err="1"/>
-                        <a:t>project</a:t>
-                      </a:r>
-                      <a:r>
-                        <a:rPr lang="da-DK" sz="1800" dirty="0"/>
-                        <a:t>)</a:t>
+                        <a:t>.SQLPROJ (Legacy VS)</a:t>
                       </a:r>
                     </a:p>
                   </a:txBody>
@@ -14907,7 +16075,7 @@
                           <a:ea typeface="+mn-ea"/>
                           <a:cs typeface="+mn-cs"/>
                         </a:rPr>
-                        <a:t>(50+ </a:t>
+                        <a:t>(140+ </a:t>
                       </a:r>
                       <a:r>
                         <a:rPr lang="da-DK" sz="2400" b="0" i="0" kern="1200" dirty="0" err="1">
@@ -15487,6 +16655,44 @@
                     <a:bodyPr/>
                     <a:lstStyle/>
                     <a:p>
+                      <a:r>
+                        <a:rPr lang="da-DK" sz="2400" dirty="0" err="1"/>
+                        <a:t>Extensive</a:t>
+                      </a:r>
+                      <a:r>
+                        <a:rPr lang="da-DK" sz="2400" dirty="0"/>
+                        <a:t> </a:t>
+                      </a:r>
+                      <a:r>
+                        <a:rPr lang="da-DK" sz="2400" dirty="0" err="1"/>
+                        <a:t>NuGet</a:t>
+                      </a:r>
+                      <a:r>
+                        <a:rPr lang="da-DK" sz="2400" dirty="0"/>
+                        <a:t> support</a:t>
+                      </a:r>
+                    </a:p>
+                  </a:txBody>
+                  <a:tcPr/>
+                </a:tc>
+                <a:tc>
+                  <a:txBody>
+                    <a:bodyPr/>
+                    <a:lstStyle/>
+                    <a:p>
+                      <a:pPr algn="ctr"/>
+                      <a:r>
+                        <a:rPr lang="da-DK" sz="2400" b="0" i="0" kern="1200" dirty="0">
+                          <a:solidFill>
+                            <a:schemeClr val="dk1"/>
+                          </a:solidFill>
+                          <a:effectLst/>
+                          <a:latin typeface="+mn-lt"/>
+                          <a:ea typeface="+mn-ea"/>
+                          <a:cs typeface="+mn-cs"/>
+                        </a:rPr>
+                        <a:t>❌ (none)</a:t>
+                      </a:r>
                       <a:endParaRPr lang="da-DK" sz="2400" dirty="0"/>
                     </a:p>
                   </a:txBody>
@@ -15497,18 +16703,35 @@
                     <a:bodyPr/>
                     <a:lstStyle/>
                     <a:p>
-                      <a:pPr algn="ctr"/>
-                      <a:endParaRPr lang="da-DK" sz="2400" dirty="0"/>
-                    </a:p>
-                  </a:txBody>
-                  <a:tcPr/>
-                </a:tc>
-                <a:tc>
-                  <a:txBody>
-                    <a:bodyPr/>
-                    <a:lstStyle/>
-                    <a:p>
-                      <a:pPr algn="ctr"/>
+                      <a:pPr marL="0" marR="0" lvl="0" indent="0" algn="ctr" defTabSz="914400" rtl="0" eaLnBrk="1" fontAlgn="auto" latinLnBrk="0" hangingPunct="1">
+                        <a:lnSpc>
+                          <a:spcPct val="100000"/>
+                        </a:lnSpc>
+                        <a:spcBef>
+                          <a:spcPts val="0"/>
+                        </a:spcBef>
+                        <a:spcAft>
+                          <a:spcPts val="0"/>
+                        </a:spcAft>
+                        <a:buClrTx/>
+                        <a:buSzTx/>
+                        <a:buFontTx/>
+                        <a:buNone/>
+                        <a:tabLst/>
+                        <a:defRPr/>
+                      </a:pPr>
+                      <a:r>
+                        <a:rPr lang="da-DK" sz="2400" b="0" i="0" kern="1200" dirty="0">
+                          <a:solidFill>
+                            <a:schemeClr val="accent6"/>
+                          </a:solidFill>
+                          <a:effectLst/>
+                          <a:latin typeface="+mn-lt"/>
+                          <a:ea typeface="+mn-ea"/>
+                          <a:cs typeface="+mn-cs"/>
+                        </a:rPr>
+                        <a:t>✔</a:t>
+                      </a:r>
                       <a:endParaRPr lang="da-DK" sz="2400" dirty="0"/>
                     </a:p>
                   </a:txBody>
@@ -15537,606 +16760,18 @@
 </p:sld>
 </file>
 
-<file path=ppt/slides/slide7.xml><?xml version="1.0" encoding="utf-8"?>
-<p:sld xmlns:a="http://schemas.openxmlformats.org/drawingml/2006/main" xmlns:r="http://schemas.openxmlformats.org/officeDocument/2006/relationships" xmlns:p="http://schemas.openxmlformats.org/presentationml/2006/main">
-  <p:cSld>
-    <p:bg>
-      <p:bgPr>
-        <a:solidFill>
-          <a:schemeClr val="bg1"/>
-        </a:solidFill>
-        <a:effectLst/>
-      </p:bgPr>
-    </p:bg>
-    <p:spTree>
-      <p:nvGrpSpPr>
-        <p:cNvPr id="1" name=""/>
-        <p:cNvGrpSpPr/>
-        <p:nvPr/>
-      </p:nvGrpSpPr>
-      <p:grpSpPr>
-        <a:xfrm>
-          <a:off x="0" y="0"/>
-          <a:ext cx="0" cy="0"/>
-          <a:chOff x="0" y="0"/>
-          <a:chExt cx="0" cy="0"/>
-        </a:xfrm>
-      </p:grpSpPr>
-      <p:sp useBgFill="1">
-        <p:nvSpPr>
-          <p:cNvPr id="10" name="Rectangle 9">
-            <a:extLst>
-              <a:ext uri="{FF2B5EF4-FFF2-40B4-BE49-F238E27FC236}">
-                <a16:creationId xmlns:a16="http://schemas.microsoft.com/office/drawing/2014/main" id="{743AA782-23D1-4521-8CAD-47662984AA08}"/>
-              </a:ext>
-              <a:ext uri="{C183D7F6-B498-43B3-948B-1728B52AA6E4}">
-                <adec:decorative xmlns:adec="http://schemas.microsoft.com/office/drawing/2017/decorative" val="1"/>
-              </a:ext>
-            </a:extLst>
-          </p:cNvPr>
-          <p:cNvSpPr>
-            <a:spLocks noGrp="1" noRot="1" noChangeAspect="1" noMove="1" noResize="1" noEditPoints="1" noAdjustHandles="1" noChangeArrowheads="1" noChangeShapeType="1" noTextEdit="1"/>
-          </p:cNvSpPr>
-          <p:nvPr>
-            <p:extLst>
-              <p:ext uri="{386F3935-93C4-4BCD-93E2-E3B085C9AB24}">
-                <p16:designElem xmlns:p16="http://schemas.microsoft.com/office/powerpoint/2015/main" val="1"/>
-              </p:ext>
-            </p:extLst>
-          </p:nvPr>
-        </p:nvSpPr>
-        <p:spPr>
-          <a:xfrm>
-            <a:off x="0" y="0"/>
-            <a:ext cx="12192000" cy="6858000"/>
-          </a:xfrm>
-          <a:prstGeom prst="rect">
-            <a:avLst/>
-          </a:prstGeom>
-          <a:ln>
-            <a:noFill/>
-          </a:ln>
-        </p:spPr>
-        <p:style>
-          <a:lnRef idx="2">
-            <a:schemeClr val="accent1">
-              <a:shade val="50000"/>
-            </a:schemeClr>
-          </a:lnRef>
-          <a:fillRef idx="1">
-            <a:schemeClr val="accent1"/>
-          </a:fillRef>
-          <a:effectRef idx="0">
-            <a:schemeClr val="accent1"/>
-          </a:effectRef>
-          <a:fontRef idx="minor">
-            <a:schemeClr val="lt1"/>
-          </a:fontRef>
-        </p:style>
-        <p:txBody>
-          <a:bodyPr rtlCol="0" anchor="ctr"/>
-          <a:lstStyle/>
-          <a:p>
-            <a:pPr algn="ctr"/>
-            <a:endParaRPr lang="en-US"/>
-          </a:p>
-        </p:txBody>
-      </p:sp>
-      <p:sp>
-        <p:nvSpPr>
-          <p:cNvPr id="2" name="Title 1">
-            <a:extLst>
-              <a:ext uri="{FF2B5EF4-FFF2-40B4-BE49-F238E27FC236}">
-                <a16:creationId xmlns:a16="http://schemas.microsoft.com/office/drawing/2014/main" id="{852AC18E-06F7-297B-4A55-D3F36AEDEDBD}"/>
-              </a:ext>
-            </a:extLst>
-          </p:cNvPr>
-          <p:cNvSpPr>
-            <a:spLocks noGrp="1"/>
-          </p:cNvSpPr>
-          <p:nvPr>
-            <p:ph type="title"/>
-          </p:nvPr>
-        </p:nvSpPr>
-        <p:spPr>
-          <a:xfrm>
-            <a:off x="630936" y="640080"/>
-            <a:ext cx="4818888" cy="1481328"/>
-          </a:xfrm>
-        </p:spPr>
-        <p:txBody>
-          <a:bodyPr anchor="b">
-            <a:normAutofit/>
-          </a:bodyPr>
-          <a:lstStyle/>
-          <a:p>
-            <a:r>
-              <a:rPr lang="da-DK" sz="5400"/>
-              <a:t>CTA</a:t>
-            </a:r>
-          </a:p>
-        </p:txBody>
-      </p:sp>
-      <p:sp>
-        <p:nvSpPr>
-          <p:cNvPr id="12" name="sketch line">
-            <a:extLst>
-              <a:ext uri="{FF2B5EF4-FFF2-40B4-BE49-F238E27FC236}">
-                <a16:creationId xmlns:a16="http://schemas.microsoft.com/office/drawing/2014/main" id="{71877DBC-BB60-40F0-AC93-2ACDBAAE60CE}"/>
-              </a:ext>
-              <a:ext uri="{C183D7F6-B498-43B3-948B-1728B52AA6E4}">
-                <adec:decorative xmlns:adec="http://schemas.microsoft.com/office/drawing/2017/decorative" val="1"/>
-              </a:ext>
-            </a:extLst>
-          </p:cNvPr>
-          <p:cNvSpPr>
-            <a:spLocks noGrp="1" noRot="1" noChangeAspect="1" noMove="1" noResize="1" noEditPoints="1" noAdjustHandles="1" noChangeArrowheads="1" noChangeShapeType="1" noTextEdit="1"/>
-          </p:cNvSpPr>
-          <p:nvPr>
-            <p:extLst>
-              <p:ext uri="{386F3935-93C4-4BCD-93E2-E3B085C9AB24}">
-                <p16:designElem xmlns:p16="http://schemas.microsoft.com/office/powerpoint/2015/main" val="1"/>
-              </p:ext>
-            </p:extLst>
-          </p:nvPr>
-        </p:nvSpPr>
-        <p:spPr>
-          <a:xfrm>
-            <a:off x="643278" y="2372868"/>
-            <a:ext cx="3255095" cy="18288"/>
-          </a:xfrm>
-          <a:custGeom>
-            <a:avLst/>
-            <a:gdLst>
-              <a:gd name="connsiteX0" fmla="*/ 0 w 3255095"/>
-              <a:gd name="connsiteY0" fmla="*/ 0 h 18288"/>
-              <a:gd name="connsiteX1" fmla="*/ 618468 w 3255095"/>
-              <a:gd name="connsiteY1" fmla="*/ 0 h 18288"/>
-              <a:gd name="connsiteX2" fmla="*/ 1269487 w 3255095"/>
-              <a:gd name="connsiteY2" fmla="*/ 0 h 18288"/>
-              <a:gd name="connsiteX3" fmla="*/ 1953057 w 3255095"/>
-              <a:gd name="connsiteY3" fmla="*/ 0 h 18288"/>
-              <a:gd name="connsiteX4" fmla="*/ 2636627 w 3255095"/>
-              <a:gd name="connsiteY4" fmla="*/ 0 h 18288"/>
-              <a:gd name="connsiteX5" fmla="*/ 3255095 w 3255095"/>
-              <a:gd name="connsiteY5" fmla="*/ 0 h 18288"/>
-              <a:gd name="connsiteX6" fmla="*/ 3255095 w 3255095"/>
-              <a:gd name="connsiteY6" fmla="*/ 18288 h 18288"/>
-              <a:gd name="connsiteX7" fmla="*/ 2538974 w 3255095"/>
-              <a:gd name="connsiteY7" fmla="*/ 18288 h 18288"/>
-              <a:gd name="connsiteX8" fmla="*/ 1822853 w 3255095"/>
-              <a:gd name="connsiteY8" fmla="*/ 18288 h 18288"/>
-              <a:gd name="connsiteX9" fmla="*/ 1171834 w 3255095"/>
-              <a:gd name="connsiteY9" fmla="*/ 18288 h 18288"/>
-              <a:gd name="connsiteX10" fmla="*/ 0 w 3255095"/>
-              <a:gd name="connsiteY10" fmla="*/ 18288 h 18288"/>
-              <a:gd name="connsiteX11" fmla="*/ 0 w 3255095"/>
-              <a:gd name="connsiteY11" fmla="*/ 0 h 18288"/>
-            </a:gdLst>
-            <a:ahLst/>
-            <a:cxnLst>
-              <a:cxn ang="0">
-                <a:pos x="connsiteX0" y="connsiteY0"/>
-              </a:cxn>
-              <a:cxn ang="0">
-                <a:pos x="connsiteX1" y="connsiteY1"/>
-              </a:cxn>
-              <a:cxn ang="0">
-                <a:pos x="connsiteX2" y="connsiteY2"/>
-              </a:cxn>
-              <a:cxn ang="0">
-                <a:pos x="connsiteX3" y="connsiteY3"/>
-              </a:cxn>
-              <a:cxn ang="0">
-                <a:pos x="connsiteX4" y="connsiteY4"/>
-              </a:cxn>
-              <a:cxn ang="0">
-                <a:pos x="connsiteX5" y="connsiteY5"/>
-              </a:cxn>
-              <a:cxn ang="0">
-                <a:pos x="connsiteX6" y="connsiteY6"/>
-              </a:cxn>
-              <a:cxn ang="0">
-                <a:pos x="connsiteX7" y="connsiteY7"/>
-              </a:cxn>
-              <a:cxn ang="0">
-                <a:pos x="connsiteX8" y="connsiteY8"/>
-              </a:cxn>
-              <a:cxn ang="0">
-                <a:pos x="connsiteX9" y="connsiteY9"/>
-              </a:cxn>
-              <a:cxn ang="0">
-                <a:pos x="connsiteX10" y="connsiteY10"/>
-              </a:cxn>
-              <a:cxn ang="0">
-                <a:pos x="connsiteX11" y="connsiteY11"/>
-              </a:cxn>
-            </a:cxnLst>
-            <a:rect l="l" t="t" r="r" b="b"/>
-            <a:pathLst>
-              <a:path w="3255095" h="18288" fill="none" extrusionOk="0">
-                <a:moveTo>
-                  <a:pt x="0" y="0"/>
-                </a:moveTo>
-                <a:cubicBezTo>
-                  <a:pt x="240201" y="-22123"/>
-                  <a:pt x="462021" y="-19623"/>
-                  <a:pt x="618468" y="0"/>
-                </a:cubicBezTo>
-                <a:cubicBezTo>
-                  <a:pt x="774915" y="19623"/>
-                  <a:pt x="974734" y="2035"/>
-                  <a:pt x="1269487" y="0"/>
-                </a:cubicBezTo>
-                <a:cubicBezTo>
-                  <a:pt x="1564240" y="-2035"/>
-                  <a:pt x="1733579" y="10639"/>
-                  <a:pt x="1953057" y="0"/>
-                </a:cubicBezTo>
-                <a:cubicBezTo>
-                  <a:pt x="2172535" y="-10639"/>
-                  <a:pt x="2453962" y="14018"/>
-                  <a:pt x="2636627" y="0"/>
-                </a:cubicBezTo>
-                <a:cubicBezTo>
-                  <a:pt x="2819292" y="-14018"/>
-                  <a:pt x="3121375" y="5399"/>
-                  <a:pt x="3255095" y="0"/>
-                </a:cubicBezTo>
-                <a:cubicBezTo>
-                  <a:pt x="3254386" y="8157"/>
-                  <a:pt x="3254682" y="12125"/>
-                  <a:pt x="3255095" y="18288"/>
-                </a:cubicBezTo>
-                <a:cubicBezTo>
-                  <a:pt x="3088545" y="23203"/>
-                  <a:pt x="2687475" y="7419"/>
-                  <a:pt x="2538974" y="18288"/>
-                </a:cubicBezTo>
-                <a:cubicBezTo>
-                  <a:pt x="2390473" y="29157"/>
-                  <a:pt x="2137381" y="-8959"/>
-                  <a:pt x="1822853" y="18288"/>
-                </a:cubicBezTo>
-                <a:cubicBezTo>
-                  <a:pt x="1508325" y="45535"/>
-                  <a:pt x="1466437" y="20385"/>
-                  <a:pt x="1171834" y="18288"/>
-                </a:cubicBezTo>
-                <a:cubicBezTo>
-                  <a:pt x="877231" y="16191"/>
-                  <a:pt x="561097" y="37643"/>
-                  <a:pt x="0" y="18288"/>
-                </a:cubicBezTo>
-                <a:cubicBezTo>
-                  <a:pt x="-46" y="12483"/>
-                  <a:pt x="-203" y="6491"/>
-                  <a:pt x="0" y="0"/>
-                </a:cubicBezTo>
-                <a:close/>
-              </a:path>
-              <a:path w="3255095" h="18288" stroke="0" extrusionOk="0">
-                <a:moveTo>
-                  <a:pt x="0" y="0"/>
-                </a:moveTo>
-                <a:cubicBezTo>
-                  <a:pt x="291965" y="19429"/>
-                  <a:pt x="363155" y="8568"/>
-                  <a:pt x="618468" y="0"/>
-                </a:cubicBezTo>
-                <a:cubicBezTo>
-                  <a:pt x="873781" y="-8568"/>
-                  <a:pt x="904459" y="-19505"/>
-                  <a:pt x="1171834" y="0"/>
-                </a:cubicBezTo>
-                <a:cubicBezTo>
-                  <a:pt x="1439209" y="19505"/>
-                  <a:pt x="1744369" y="9790"/>
-                  <a:pt x="1887955" y="0"/>
-                </a:cubicBezTo>
-                <a:cubicBezTo>
-                  <a:pt x="2031541" y="-9790"/>
-                  <a:pt x="2346378" y="21240"/>
-                  <a:pt x="2506423" y="0"/>
-                </a:cubicBezTo>
-                <a:cubicBezTo>
-                  <a:pt x="2666468" y="-21240"/>
-                  <a:pt x="2990257" y="30414"/>
-                  <a:pt x="3255095" y="0"/>
-                </a:cubicBezTo>
-                <a:cubicBezTo>
-                  <a:pt x="3254831" y="4493"/>
-                  <a:pt x="3255479" y="9472"/>
-                  <a:pt x="3255095" y="18288"/>
-                </a:cubicBezTo>
-                <a:cubicBezTo>
-                  <a:pt x="3120743" y="16690"/>
-                  <a:pt x="2759628" y="42462"/>
-                  <a:pt x="2604076" y="18288"/>
-                </a:cubicBezTo>
-                <a:cubicBezTo>
-                  <a:pt x="2448524" y="-5886"/>
-                  <a:pt x="2184336" y="19599"/>
-                  <a:pt x="1887955" y="18288"/>
-                </a:cubicBezTo>
-                <a:cubicBezTo>
-                  <a:pt x="1591574" y="16977"/>
-                  <a:pt x="1548845" y="6870"/>
-                  <a:pt x="1334589" y="18288"/>
-                </a:cubicBezTo>
-                <a:cubicBezTo>
-                  <a:pt x="1120333" y="29706"/>
-                  <a:pt x="996014" y="9662"/>
-                  <a:pt x="683570" y="18288"/>
-                </a:cubicBezTo>
-                <a:cubicBezTo>
-                  <a:pt x="371126" y="26914"/>
-                  <a:pt x="198687" y="16167"/>
-                  <a:pt x="0" y="18288"/>
-                </a:cubicBezTo>
-                <a:cubicBezTo>
-                  <a:pt x="843" y="9577"/>
-                  <a:pt x="371" y="6900"/>
-                  <a:pt x="0" y="0"/>
-                </a:cubicBezTo>
-                <a:close/>
-              </a:path>
-            </a:pathLst>
-          </a:custGeom>
-          <a:solidFill>
-            <a:schemeClr val="accent2"/>
-          </a:solidFill>
-          <a:ln w="38100" cap="rnd">
-            <a:solidFill>
-              <a:schemeClr val="accent2"/>
-            </a:solidFill>
-            <a:round/>
-            <a:extLst>
-              <a:ext uri="{C807C97D-BFC1-408E-A445-0C87EB9F89A2}">
-                <ask:lineSketchStyleProps xmlns:ask="http://schemas.microsoft.com/office/drawing/2018/sketchyshapes" sd="1219033472">
-                  <a:prstGeom prst="rect">
-                    <a:avLst/>
-                  </a:prstGeom>
-                  <ask:type>
-                    <ask:lineSketchFreehand/>
-                  </ask:type>
-                </ask:lineSketchStyleProps>
-              </a:ext>
-            </a:extLst>
-          </a:ln>
-        </p:spPr>
-        <p:style>
-          <a:lnRef idx="2">
-            <a:schemeClr val="accent1">
-              <a:shade val="50000"/>
-            </a:schemeClr>
-          </a:lnRef>
-          <a:fillRef idx="1">
-            <a:schemeClr val="accent1"/>
-          </a:fillRef>
-          <a:effectRef idx="0">
-            <a:schemeClr val="accent1"/>
-          </a:effectRef>
-          <a:fontRef idx="minor">
-            <a:schemeClr val="lt1"/>
-          </a:fontRef>
-        </p:style>
-        <p:txBody>
-          <a:bodyPr rtlCol="0" anchor="ctr"/>
-          <a:lstStyle/>
-          <a:p>
-            <a:pPr algn="ctr"/>
-            <a:endParaRPr lang="en-US"/>
-          </a:p>
-        </p:txBody>
-      </p:sp>
-      <p:sp>
-        <p:nvSpPr>
-          <p:cNvPr id="3" name="Content Placeholder 2">
-            <a:extLst>
-              <a:ext uri="{FF2B5EF4-FFF2-40B4-BE49-F238E27FC236}">
-                <a16:creationId xmlns:a16="http://schemas.microsoft.com/office/drawing/2014/main" id="{98B6C42F-8CB3-FB57-D11C-4033DD156FEC}"/>
-              </a:ext>
-            </a:extLst>
-          </p:cNvPr>
-          <p:cNvSpPr>
-            <a:spLocks noGrp="1"/>
-          </p:cNvSpPr>
-          <p:nvPr>
-            <p:ph idx="1"/>
-          </p:nvPr>
-        </p:nvSpPr>
-        <p:spPr>
-          <a:xfrm>
-            <a:off x="630936" y="2660904"/>
-            <a:ext cx="6122202" cy="3547872"/>
-          </a:xfrm>
-        </p:spPr>
-        <p:txBody>
-          <a:bodyPr anchor="t">
-            <a:normAutofit/>
-          </a:bodyPr>
-          <a:lstStyle/>
-          <a:p>
-            <a:r>
-              <a:rPr lang="da-DK" sz="2200" dirty="0" err="1"/>
-              <a:t>Add</a:t>
-            </a:r>
-            <a:r>
-              <a:rPr lang="da-DK" sz="2200" dirty="0"/>
-              <a:t> </a:t>
-            </a:r>
-            <a:r>
-              <a:rPr lang="da-DK" sz="2200" dirty="0" err="1"/>
-              <a:t>you</a:t>
-            </a:r>
-            <a:r>
-              <a:rPr lang="da-DK" sz="2200" dirty="0"/>
-              <a:t> database </a:t>
-            </a:r>
-            <a:r>
-              <a:rPr lang="da-DK" sz="2200" dirty="0" err="1"/>
-              <a:t>schema</a:t>
-            </a:r>
-            <a:r>
-              <a:rPr lang="da-DK" sz="2200" dirty="0"/>
-              <a:t> to source </a:t>
-            </a:r>
-            <a:r>
-              <a:rPr lang="da-DK" sz="2200" dirty="0" err="1"/>
-              <a:t>control</a:t>
-            </a:r>
-            <a:endParaRPr lang="da-DK" sz="2200" dirty="0"/>
-          </a:p>
-          <a:p>
-            <a:r>
-              <a:rPr lang="da-DK" sz="2200" dirty="0" err="1"/>
-              <a:t>Enable</a:t>
-            </a:r>
-            <a:r>
-              <a:rPr lang="da-DK" sz="2200" dirty="0"/>
-              <a:t> </a:t>
-            </a:r>
-            <a:r>
-              <a:rPr lang="da-DK" sz="2200" dirty="0" err="1"/>
-              <a:t>code</a:t>
-            </a:r>
-            <a:r>
-              <a:rPr lang="da-DK" sz="2200" dirty="0"/>
-              <a:t> </a:t>
-            </a:r>
-            <a:r>
-              <a:rPr lang="da-DK" sz="2200" dirty="0" err="1"/>
-              <a:t>analysis</a:t>
-            </a:r>
-            <a:r>
-              <a:rPr lang="da-DK" sz="2200" dirty="0"/>
-              <a:t> </a:t>
-            </a:r>
-            <a:r>
-              <a:rPr lang="da-DK" sz="2200" dirty="0" err="1"/>
-              <a:t>locally</a:t>
-            </a:r>
-            <a:r>
-              <a:rPr lang="da-DK" sz="2200" dirty="0"/>
-              <a:t> and in CI</a:t>
-            </a:r>
-          </a:p>
-          <a:p>
-            <a:r>
-              <a:rPr lang="da-DK" sz="2200" dirty="0" err="1"/>
-              <a:t>Optional</a:t>
-            </a:r>
-            <a:r>
-              <a:rPr lang="da-DK" sz="2200" dirty="0"/>
-              <a:t>: </a:t>
-            </a:r>
-            <a:r>
-              <a:rPr lang="da-DK" sz="2200" dirty="0" err="1"/>
-              <a:t>Create</a:t>
-            </a:r>
-            <a:r>
-              <a:rPr lang="da-DK" sz="2200" dirty="0"/>
-              <a:t> </a:t>
-            </a:r>
-            <a:r>
-              <a:rPr lang="da-DK" sz="2200" dirty="0" err="1"/>
-              <a:t>your</a:t>
-            </a:r>
-            <a:r>
-              <a:rPr lang="da-DK" sz="2200" dirty="0"/>
-              <a:t> </a:t>
-            </a:r>
-            <a:r>
-              <a:rPr lang="da-DK" sz="2200" dirty="0" err="1"/>
-              <a:t>own</a:t>
-            </a:r>
-            <a:r>
-              <a:rPr lang="da-DK" sz="2200" dirty="0"/>
-              <a:t> </a:t>
-            </a:r>
-            <a:r>
-              <a:rPr lang="da-DK" sz="2200" dirty="0" err="1"/>
-              <a:t>rules</a:t>
-            </a:r>
-            <a:r>
-              <a:rPr lang="da-DK" sz="2200" dirty="0"/>
-              <a:t> and </a:t>
-            </a:r>
-            <a:r>
-              <a:rPr lang="da-DK" sz="2200" dirty="0" err="1"/>
-              <a:t>contribute</a:t>
-            </a:r>
-            <a:r>
-              <a:rPr lang="da-DK" sz="2200" dirty="0"/>
-              <a:t> </a:t>
-            </a:r>
-            <a:r>
-              <a:rPr lang="da-DK" sz="2200" dirty="0" err="1"/>
-              <a:t>them</a:t>
-            </a:r>
-            <a:r>
-              <a:rPr lang="da-DK" sz="2200" dirty="0"/>
-              <a:t> back to the community</a:t>
-            </a:r>
-          </a:p>
-          <a:p>
-            <a:r>
-              <a:rPr lang="da-DK" sz="2200" dirty="0"/>
-              <a:t>Q &amp; A</a:t>
-            </a:r>
-          </a:p>
-        </p:txBody>
-      </p:sp>
-      <p:pic>
-        <p:nvPicPr>
-          <p:cNvPr id="5" name="Picture 4" descr="A qr code with black dots&#10;&#10;Description automatically generated">
-            <a:extLst>
-              <a:ext uri="{FF2B5EF4-FFF2-40B4-BE49-F238E27FC236}">
-                <a16:creationId xmlns:a16="http://schemas.microsoft.com/office/drawing/2014/main" id="{1ACEDAF7-1A70-3E40-9618-12BBF5CB9F25}"/>
-              </a:ext>
-            </a:extLst>
-          </p:cNvPr>
-          <p:cNvPicPr>
-            <a:picLocks noChangeAspect="1"/>
-          </p:cNvPicPr>
-          <p:nvPr/>
-        </p:nvPicPr>
-        <p:blipFill>
-          <a:blip r:embed="rId2"/>
-          <a:stretch>
-            <a:fillRect/>
-          </a:stretch>
-        </p:blipFill>
-        <p:spPr>
-          <a:xfrm>
-            <a:off x="6862194" y="904031"/>
-            <a:ext cx="4695822" cy="4343974"/>
-          </a:xfrm>
-          <a:prstGeom prst="rect">
-            <a:avLst/>
-          </a:prstGeom>
-        </p:spPr>
-      </p:pic>
-    </p:spTree>
-    <p:extLst>
-      <p:ext uri="{BB962C8B-B14F-4D97-AF65-F5344CB8AC3E}">
-        <p14:creationId xmlns:p14="http://schemas.microsoft.com/office/powerpoint/2010/main" val="1406646759"/>
-      </p:ext>
-    </p:extLst>
-  </p:cSld>
-  <p:clrMapOvr>
-    <a:masterClrMapping/>
-  </p:clrMapOvr>
-</p:sld>
-</file>
-
 <file path=ppt/slides/slide8.xml><?xml version="1.0" encoding="utf-8"?>
 <p:sld xmlns:a="http://schemas.openxmlformats.org/drawingml/2006/main" xmlns:r="http://schemas.openxmlformats.org/officeDocument/2006/relationships" xmlns:p="http://schemas.openxmlformats.org/presentationml/2006/main">
   <p:cSld>
     <p:spTree>
       <p:nvGrpSpPr>
-        <p:cNvPr id="1" name=""/>
+        <p:cNvPr id="1" name="">
+          <a:extLst>
+            <a:ext uri="{FF2B5EF4-FFF2-40B4-BE49-F238E27FC236}">
+              <a16:creationId xmlns:a16="http://schemas.microsoft.com/office/drawing/2014/main" id="{A0EBBA3D-1D4D-7E61-1738-8D5A6CFDAD91}"/>
+            </a:ext>
+          </a:extLst>
+        </p:cNvPr>
         <p:cNvGrpSpPr/>
         <p:nvPr/>
       </p:nvGrpSpPr>
@@ -16153,7 +16788,7 @@
           <p:cNvPr id="2" name="Title 1">
             <a:extLst>
               <a:ext uri="{FF2B5EF4-FFF2-40B4-BE49-F238E27FC236}">
-                <a16:creationId xmlns:a16="http://schemas.microsoft.com/office/drawing/2014/main" id="{B6E02EDD-BF75-C1E2-C4E0-452E278B9E12}"/>
+                <a16:creationId xmlns:a16="http://schemas.microsoft.com/office/drawing/2014/main" id="{06BAE2BC-381C-A57E-FCAD-277D509EECB8}"/>
               </a:ext>
             </a:extLst>
           </p:cNvPr>
@@ -16161,7 +16796,7 @@
             <a:spLocks noGrp="1"/>
           </p:cNvSpPr>
           <p:nvPr>
-            <p:ph type="ctrTitle"/>
+            <p:ph type="title"/>
           </p:nvPr>
         </p:nvSpPr>
         <p:spPr/>
@@ -16170,77 +16805,46 @@
           <a:lstStyle/>
           <a:p>
             <a:r>
-              <a:rPr lang="da-DK" dirty="0" err="1"/>
-              <a:t>What</a:t>
-            </a:r>
-            <a:r>
-              <a:rPr lang="da-DK" dirty="0"/>
-              <a:t> is a </a:t>
-            </a:r>
-            <a:r>
-              <a:rPr lang="da-DK" dirty="0" err="1"/>
-              <a:t>dacpac</a:t>
-            </a:r>
-            <a:r>
-              <a:rPr lang="da-DK" dirty="0"/>
-              <a:t> and </a:t>
-            </a:r>
-            <a:r>
-              <a:rPr lang="da-DK" dirty="0" err="1"/>
-              <a:t>why</a:t>
-            </a:r>
-            <a:r>
-              <a:rPr lang="da-DK" dirty="0"/>
-              <a:t> </a:t>
-            </a:r>
-            <a:r>
-              <a:rPr lang="da-DK" dirty="0" err="1"/>
-              <a:t>should</a:t>
-            </a:r>
-            <a:r>
-              <a:rPr lang="da-DK" dirty="0"/>
-              <a:t> I </a:t>
-            </a:r>
-            <a:r>
-              <a:rPr lang="da-DK" dirty="0" err="1"/>
-              <a:t>care</a:t>
-            </a:r>
-            <a:r>
-              <a:rPr lang="da-DK" dirty="0"/>
-              <a:t>?</a:t>
-            </a:r>
+              <a:rPr lang="da-DK"/>
+              <a:t>Q  &amp; A</a:t>
+            </a:r>
+            <a:endParaRPr lang="da-DK" dirty="0"/>
           </a:p>
         </p:txBody>
       </p:sp>
-      <p:sp>
-        <p:nvSpPr>
-          <p:cNvPr id="3" name="Subtitle 2">
+      <p:pic>
+        <p:nvPicPr>
+          <p:cNvPr id="5" name="Content Placeholder 4">
             <a:extLst>
               <a:ext uri="{FF2B5EF4-FFF2-40B4-BE49-F238E27FC236}">
-                <a16:creationId xmlns:a16="http://schemas.microsoft.com/office/drawing/2014/main" id="{FC34CC98-5EC0-A5E9-F6EC-E0FF61BD140B}"/>
+                <a16:creationId xmlns:a16="http://schemas.microsoft.com/office/drawing/2014/main" id="{A59D8A4D-BC32-FCB3-F0F4-F3C435D72A5E}"/>
               </a:ext>
             </a:extLst>
           </p:cNvPr>
-          <p:cNvSpPr>
-            <a:spLocks noGrp="1"/>
-          </p:cNvSpPr>
+          <p:cNvPicPr>
+            <a:picLocks noGrp="1" noChangeAspect="1"/>
+          </p:cNvPicPr>
           <p:nvPr>
-            <p:ph type="subTitle" idx="1"/>
+            <p:ph idx="1"/>
           </p:nvPr>
-        </p:nvSpPr>
-        <p:spPr/>
-        <p:txBody>
-          <a:bodyPr/>
-          <a:lstStyle/>
-          <a:p>
-            <a:endParaRPr lang="da-DK"/>
-          </a:p>
-        </p:txBody>
-      </p:sp>
+        </p:nvPicPr>
+        <p:blipFill>
+          <a:blip r:embed="rId2"/>
+          <a:stretch>
+            <a:fillRect/>
+          </a:stretch>
+        </p:blipFill>
+        <p:spPr>
+          <a:xfrm>
+            <a:off x="2874317" y="1916599"/>
+            <a:ext cx="6669580" cy="3930082"/>
+          </a:xfrm>
+        </p:spPr>
+      </p:pic>
     </p:spTree>
     <p:extLst>
       <p:ext uri="{BB962C8B-B14F-4D97-AF65-F5344CB8AC3E}">
-        <p14:creationId xmlns:p14="http://schemas.microsoft.com/office/powerpoint/2010/main" val="3361272730"/>
+        <p14:creationId xmlns:p14="http://schemas.microsoft.com/office/powerpoint/2010/main" val="487434153"/>
       </p:ext>
     </p:extLst>
   </p:cSld>
@@ -16255,7 +16859,13 @@
   <p:cSld>
     <p:spTree>
       <p:nvGrpSpPr>
-        <p:cNvPr id="1" name=""/>
+        <p:cNvPr id="1" name="">
+          <a:extLst>
+            <a:ext uri="{FF2B5EF4-FFF2-40B4-BE49-F238E27FC236}">
+              <a16:creationId xmlns:a16="http://schemas.microsoft.com/office/drawing/2014/main" id="{C03D46EE-FF28-5231-08CB-F5FDBAC097A5}"/>
+            </a:ext>
+          </a:extLst>
+        </p:cNvPr>
         <p:cNvGrpSpPr/>
         <p:nvPr/>
       </p:nvGrpSpPr>
@@ -16272,7 +16882,7 @@
           <p:cNvPr id="2" name="Title 1">
             <a:extLst>
               <a:ext uri="{FF2B5EF4-FFF2-40B4-BE49-F238E27FC236}">
-                <a16:creationId xmlns:a16="http://schemas.microsoft.com/office/drawing/2014/main" id="{83C2E1C5-9DBD-026F-54AD-8267C48752C3}"/>
+                <a16:creationId xmlns:a16="http://schemas.microsoft.com/office/drawing/2014/main" id="{2E6EEB31-E4FC-2566-C8F1-45B5FB08A41F}"/>
               </a:ext>
             </a:extLst>
           </p:cNvPr>
@@ -16289,12 +16899,8 @@
           <a:lstStyle/>
           <a:p>
             <a:r>
-              <a:rPr lang="da-DK" dirty="0" err="1"/>
-              <a:t>Why</a:t>
-            </a:r>
-            <a:r>
               <a:rPr lang="da-DK" dirty="0"/>
-              <a:t>?</a:t>
+              <a:t>Q  &amp; A</a:t>
             </a:r>
           </a:p>
         </p:txBody>
@@ -16304,7 +16910,7 @@
           <p:cNvPr id="3" name="Content Placeholder 2">
             <a:extLst>
               <a:ext uri="{FF2B5EF4-FFF2-40B4-BE49-F238E27FC236}">
-                <a16:creationId xmlns:a16="http://schemas.microsoft.com/office/drawing/2014/main" id="{FE1AEA13-D193-3591-483D-99C9CBEA719D}"/>
+                <a16:creationId xmlns:a16="http://schemas.microsoft.com/office/drawing/2014/main" id="{47C55434-F03A-B8A3-C83A-165FC3B93CD3}"/>
               </a:ext>
             </a:extLst>
           </p:cNvPr>
@@ -16318,38 +16924,129 @@
         <p:spPr/>
         <p:txBody>
           <a:bodyPr>
-            <a:normAutofit fontScale="92500" lnSpcReduction="20000"/>
+            <a:normAutofit/>
           </a:bodyPr>
           <a:lstStyle/>
           <a:p>
-            <a:pPr marL="0" indent="0">
-              <a:buNone/>
-            </a:pPr>
-            <a:r>
-              <a:rPr lang="da-DK" b="0" i="0" dirty="0">
-                <a:solidFill>
-                  <a:srgbClr val="555555"/>
-                </a:solidFill>
-                <a:effectLst/>
-                <a:latin typeface="Open Sans" panose="020B0606030504020204" pitchFamily="34" charset="0"/>
-              </a:rPr>
-              <a:t>Data Tier Application Package</a:t>
-            </a:r>
-            <a:br>
-              <a:rPr lang="da-DK" b="0" i="0" dirty="0">
-                <a:solidFill>
-                  <a:srgbClr val="555555"/>
-                </a:solidFill>
-                <a:effectLst/>
-                <a:latin typeface="Open Sans" panose="020B0606030504020204" pitchFamily="34" charset="0"/>
-              </a:rPr>
-            </a:br>
-            <a:endParaRPr lang="da-DK" dirty="0"/>
+            <a:r>
+              <a:rPr lang="da-DK" sz="3200" dirty="0"/>
+              <a:t>Handling </a:t>
+            </a:r>
+            <a:r>
+              <a:rPr lang="da-DK" sz="3200" dirty="0" err="1"/>
+              <a:t>destructive</a:t>
+            </a:r>
+            <a:r>
+              <a:rPr lang="da-DK" sz="3200" dirty="0"/>
+              <a:t> </a:t>
+            </a:r>
+            <a:r>
+              <a:rPr lang="da-DK" sz="3200" dirty="0" err="1"/>
+              <a:t>schema</a:t>
+            </a:r>
+            <a:r>
+              <a:rPr lang="da-DK" sz="3200" dirty="0"/>
+              <a:t> </a:t>
+            </a:r>
+            <a:r>
+              <a:rPr lang="da-DK" sz="3200" dirty="0" err="1"/>
+              <a:t>changes</a:t>
+            </a:r>
+            <a:r>
+              <a:rPr lang="da-DK" sz="3200" dirty="0"/>
+              <a:t>?</a:t>
+            </a:r>
           </a:p>
           <a:p>
             <a:r>
+              <a:rPr lang="da-DK" sz="3200" dirty="0"/>
+              <a:t>This is a community </a:t>
+            </a:r>
+            <a:r>
               <a:rPr lang="da-DK" sz="3200" dirty="0" err="1"/>
-              <a:t>Get</a:t>
+              <a:t>project</a:t>
+            </a:r>
+            <a:r>
+              <a:rPr lang="da-DK" sz="3200" dirty="0"/>
+              <a:t>, </a:t>
+            </a:r>
+            <a:r>
+              <a:rPr lang="da-DK" sz="3200" dirty="0" err="1"/>
+              <a:t>what</a:t>
+            </a:r>
+            <a:r>
+              <a:rPr lang="da-DK" sz="3200" dirty="0"/>
+              <a:t> is MS </a:t>
+            </a:r>
+            <a:r>
+              <a:rPr lang="da-DK" sz="3200" dirty="0" err="1"/>
+              <a:t>doing</a:t>
+            </a:r>
+            <a:r>
+              <a:rPr lang="da-DK" sz="3200" dirty="0"/>
+              <a:t>?</a:t>
+            </a:r>
+          </a:p>
+          <a:p>
+            <a:r>
+              <a:rPr lang="da-DK" sz="3200" dirty="0" err="1"/>
+              <a:t>Sharing</a:t>
+            </a:r>
+            <a:r>
+              <a:rPr lang="da-DK" sz="3200" dirty="0"/>
+              <a:t> parts of a database (</a:t>
+            </a:r>
+            <a:r>
+              <a:rPr lang="da-DK" sz="3200" dirty="0" err="1"/>
+              <a:t>f.ex</a:t>
+            </a:r>
+            <a:r>
+              <a:rPr lang="da-DK" sz="3200" dirty="0"/>
+              <a:t>. </a:t>
+            </a:r>
+            <a:r>
+              <a:rPr lang="da-DK" sz="3200" dirty="0" err="1"/>
+              <a:t>monitoring</a:t>
+            </a:r>
+            <a:r>
+              <a:rPr lang="da-DK" sz="3200" dirty="0"/>
+              <a:t>) ?</a:t>
+            </a:r>
+          </a:p>
+          <a:p>
+            <a:r>
+              <a:rPr lang="da-DK" sz="3200" dirty="0" err="1"/>
+              <a:t>Does</a:t>
+            </a:r>
+            <a:r>
+              <a:rPr lang="da-DK" sz="3200" dirty="0"/>
+              <a:t> it </a:t>
+            </a:r>
+            <a:r>
+              <a:rPr lang="da-DK" sz="3200" dirty="0" err="1"/>
+              <a:t>work</a:t>
+            </a:r>
+            <a:r>
+              <a:rPr lang="da-DK" sz="3200" dirty="0"/>
+              <a:t> on </a:t>
+            </a:r>
+            <a:r>
+              <a:rPr lang="da-DK" sz="3200" dirty="0" err="1"/>
+              <a:t>Azure</a:t>
+            </a:r>
+            <a:r>
+              <a:rPr lang="da-DK" sz="3200" dirty="0"/>
+              <a:t> SQL Databases?</a:t>
+            </a:r>
+          </a:p>
+          <a:p>
+            <a:r>
+              <a:rPr lang="da-DK" sz="3200" dirty="0"/>
+              <a:t>How </a:t>
+            </a:r>
+            <a:r>
+              <a:rPr lang="da-DK" sz="3200" dirty="0" err="1"/>
+              <a:t>would</a:t>
             </a:r>
             <a:r>
               <a:rPr lang="da-DK" sz="3200" dirty="0"/>
@@ -16357,22 +17054,7 @@
             </a:r>
             <a:r>
               <a:rPr lang="da-DK" sz="3200" dirty="0" err="1"/>
-              <a:t>your</a:t>
-            </a:r>
-            <a:r>
-              <a:rPr lang="da-DK" sz="3200" dirty="0"/>
-              <a:t> database under source </a:t>
-            </a:r>
-            <a:r>
-              <a:rPr lang="da-DK" sz="3200" dirty="0" err="1"/>
-              <a:t>control</a:t>
-            </a:r>
-            <a:endParaRPr lang="da-DK" sz="3200" dirty="0"/>
-          </a:p>
-          <a:p>
-            <a:r>
-              <a:rPr lang="da-DK" sz="3200" dirty="0" err="1"/>
-              <a:t>Ensure</a:t>
+              <a:t>this</a:t>
             </a:r>
             <a:r>
               <a:rPr lang="da-DK" sz="3200" dirty="0"/>
@@ -16380,186 +17062,11 @@
             </a:r>
             <a:r>
               <a:rPr lang="da-DK" sz="3200" dirty="0" err="1"/>
-              <a:t>your</a:t>
+              <a:t>work</a:t>
             </a:r>
             <a:r>
               <a:rPr lang="da-DK" sz="3200" dirty="0"/>
-              <a:t> .sql scripts ”</a:t>
-            </a:r>
-            <a:r>
-              <a:rPr lang="da-DK" sz="3200" dirty="0" err="1"/>
-              <a:t>build</a:t>
-            </a:r>
-            <a:r>
-              <a:rPr lang="da-DK" sz="3200" dirty="0"/>
-              <a:t>” – </a:t>
-            </a:r>
-            <a:r>
-              <a:rPr lang="da-DK" sz="3200" dirty="0" err="1"/>
-              <a:t>code</a:t>
-            </a:r>
-            <a:r>
-              <a:rPr lang="da-DK" sz="3200" dirty="0"/>
-              <a:t> </a:t>
-            </a:r>
-            <a:r>
-              <a:rPr lang="da-DK" sz="3200" dirty="0" err="1"/>
-              <a:t>validation</a:t>
-            </a:r>
-            <a:endParaRPr lang="da-DK" sz="3200" dirty="0"/>
-          </a:p>
-          <a:p>
-            <a:r>
-              <a:rPr lang="da-DK" sz="3200" dirty="0" err="1"/>
-              <a:t>Ensure</a:t>
-            </a:r>
-            <a:r>
-              <a:rPr lang="da-DK" sz="3200" dirty="0"/>
-              <a:t> </a:t>
-            </a:r>
-            <a:r>
-              <a:rPr lang="da-DK" sz="3200" dirty="0" err="1"/>
-              <a:t>your</a:t>
-            </a:r>
-            <a:r>
-              <a:rPr lang="da-DK" sz="3200" dirty="0"/>
-              <a:t> .sql scripts </a:t>
-            </a:r>
-            <a:r>
-              <a:rPr lang="da-DK" sz="3200" dirty="0" err="1"/>
-              <a:t>follow</a:t>
-            </a:r>
-            <a:r>
-              <a:rPr lang="da-DK" sz="3200" dirty="0"/>
-              <a:t> business </a:t>
-            </a:r>
-            <a:r>
-              <a:rPr lang="da-DK" sz="3200" dirty="0" err="1"/>
-              <a:t>rules</a:t>
-            </a:r>
-            <a:r>
-              <a:rPr lang="da-DK" sz="3200" dirty="0"/>
-              <a:t> – </a:t>
-            </a:r>
-            <a:r>
-              <a:rPr lang="da-DK" sz="3200" dirty="0" err="1"/>
-              <a:t>code</a:t>
-            </a:r>
-            <a:r>
-              <a:rPr lang="da-DK" sz="3200" dirty="0"/>
-              <a:t> </a:t>
-            </a:r>
-            <a:r>
-              <a:rPr lang="da-DK" sz="3200" dirty="0" err="1"/>
-              <a:t>analysis</a:t>
-            </a:r>
-            <a:endParaRPr lang="da-DK" sz="3200" dirty="0"/>
-          </a:p>
-          <a:p>
-            <a:r>
-              <a:rPr lang="da-DK" sz="3200" dirty="0" err="1"/>
-              <a:t>Deploy</a:t>
-            </a:r>
-            <a:r>
-              <a:rPr lang="da-DK" sz="3200" dirty="0"/>
-              <a:t> </a:t>
-            </a:r>
-            <a:r>
-              <a:rPr lang="da-DK" sz="3200" dirty="0" err="1"/>
-              <a:t>changes</a:t>
-            </a:r>
-            <a:r>
-              <a:rPr lang="da-DK" sz="3200" dirty="0"/>
-              <a:t> to the database </a:t>
-            </a:r>
-            <a:r>
-              <a:rPr lang="da-DK" sz="3200" dirty="0" err="1"/>
-              <a:t>schema</a:t>
-            </a:r>
-            <a:r>
-              <a:rPr lang="da-DK" sz="3200" dirty="0"/>
-              <a:t> with </a:t>
-            </a:r>
-            <a:r>
-              <a:rPr lang="da-DK" sz="3200" dirty="0" err="1"/>
-              <a:t>changes</a:t>
-            </a:r>
-            <a:r>
-              <a:rPr lang="da-DK" sz="3200" dirty="0"/>
-              <a:t> to </a:t>
-            </a:r>
-            <a:r>
-              <a:rPr lang="da-DK" sz="3200" dirty="0" err="1"/>
-              <a:t>your</a:t>
-            </a:r>
-            <a:r>
-              <a:rPr lang="da-DK" sz="3200" dirty="0"/>
-              <a:t> app</a:t>
-            </a:r>
-          </a:p>
-          <a:p>
-            <a:r>
-              <a:rPr lang="da-DK" sz="3200" dirty="0"/>
-              <a:t>No more migration scripts – </a:t>
-            </a:r>
-            <a:r>
-              <a:rPr lang="da-DK" sz="3200" dirty="0" err="1"/>
-              <a:t>simply</a:t>
-            </a:r>
-            <a:r>
-              <a:rPr lang="da-DK" sz="3200" dirty="0"/>
-              <a:t> </a:t>
-            </a:r>
-            <a:r>
-              <a:rPr lang="da-DK" sz="3200" dirty="0" err="1"/>
-              <a:t>describe</a:t>
-            </a:r>
-            <a:r>
-              <a:rPr lang="da-DK" sz="3200" dirty="0"/>
-              <a:t> </a:t>
-            </a:r>
-            <a:r>
-              <a:rPr lang="da-DK" sz="3200" dirty="0" err="1"/>
-              <a:t>your</a:t>
-            </a:r>
-            <a:r>
-              <a:rPr lang="da-DK" sz="3200" dirty="0"/>
-              <a:t> </a:t>
-            </a:r>
-            <a:r>
-              <a:rPr lang="da-DK" sz="3200" dirty="0" err="1"/>
-              <a:t>desired</a:t>
-            </a:r>
-            <a:r>
-              <a:rPr lang="da-DK" sz="3200" dirty="0"/>
-              <a:t> </a:t>
-            </a:r>
-            <a:r>
-              <a:rPr lang="da-DK" sz="3200" dirty="0" err="1"/>
-              <a:t>state</a:t>
-            </a:r>
-            <a:endParaRPr lang="da-DK" sz="3200" dirty="0"/>
-          </a:p>
-          <a:p>
-            <a:r>
-              <a:rPr lang="da-DK" sz="3200" dirty="0"/>
-              <a:t>Cross platform </a:t>
-            </a:r>
-            <a:r>
-              <a:rPr lang="da-DK" sz="3200" dirty="0" err="1"/>
-              <a:t>build</a:t>
-            </a:r>
-            <a:r>
-              <a:rPr lang="da-DK" sz="3200" dirty="0"/>
-              <a:t> and </a:t>
-            </a:r>
-            <a:r>
-              <a:rPr lang="da-DK" sz="3200" dirty="0" err="1"/>
-              <a:t>deployment</a:t>
-            </a:r>
-            <a:r>
-              <a:rPr lang="da-DK" sz="3200" dirty="0"/>
-              <a:t> support</a:t>
+              <a:t> with EF Core?</a:t>
             </a:r>
           </a:p>
           <a:p>
@@ -16573,7 +17080,7 @@
     </p:spTree>
     <p:extLst>
       <p:ext uri="{BB962C8B-B14F-4D97-AF65-F5344CB8AC3E}">
-        <p14:creationId xmlns:p14="http://schemas.microsoft.com/office/powerpoint/2010/main" val="2807965468"/>
+        <p14:creationId xmlns:p14="http://schemas.microsoft.com/office/powerpoint/2010/main" val="3608072289"/>
       </p:ext>
     </p:extLst>
   </p:cSld>

</xml_diff>